<commit_message>
Commit 8 Juni 2017
</commit_message>
<xml_diff>
--- a/Bahasa Inggris 6/Snort Real-Time Alerting.pptx
+++ b/Bahasa Inggris 6/Snort Real-Time Alerting.pptx
@@ -11,7 +11,9 @@
     <p:sldId id="263" r:id="rId5"/>
     <p:sldId id="261" r:id="rId6"/>
     <p:sldId id="260" r:id="rId7"/>
-    <p:sldId id="262" r:id="rId8"/>
+    <p:sldId id="265" r:id="rId8"/>
+    <p:sldId id="262" r:id="rId9"/>
+    <p:sldId id="266" r:id="rId10"/>
   </p:sldIdLst>
   <p:sldSz cx="9144000" cy="5143500" type="screen16x9"/>
   <p:notesSz cx="6858000" cy="9144000"/>
@@ -350,7 +352,7 @@
           <a:p>
             <a:fld id="{2069C06D-4ED8-42C6-905D-CA84CA1B6CBF}" type="datetime2">
               <a:rPr lang="en-US" smtClean="0"/>
-              <a:t>Friday, May 5, 2017</a:t>
+              <a:t>Wednesday, June 7, 2017</a:t>
             </a:fld>
             <a:endParaRPr lang="en-US" dirty="0"/>
           </a:p>
@@ -521,7 +523,7 @@
           <a:p>
             <a:fld id="{A56EEE0E-EDB0-4D84-86B0-50833DF22902}" type="datetime2">
               <a:rPr lang="en-US" smtClean="0"/>
-              <a:t>Friday, May 5, 2017</a:t>
+              <a:t>Wednesday, June 7, 2017</a:t>
             </a:fld>
             <a:endParaRPr lang="en-US"/>
           </a:p>
@@ -697,7 +699,7 @@
           <a:p>
             <a:fld id="{5114372C-B5AB-4C39-B273-B99224EB4DD5}" type="datetime2">
               <a:rPr lang="en-US" smtClean="0"/>
-              <a:t>Friday, May 5, 2017</a:t>
+              <a:t>Wednesday, June 7, 2017</a:t>
             </a:fld>
             <a:endParaRPr lang="en-US"/>
           </a:p>
@@ -863,7 +865,7 @@
           <a:p>
             <a:fld id="{14CB1CAA-32CD-4B55-B92A-B8F0843CACF4}" type="datetime2">
               <a:rPr lang="en-US" smtClean="0"/>
-              <a:t>Friday, May 5, 2017</a:t>
+              <a:t>Wednesday, June 7, 2017</a:t>
             </a:fld>
             <a:endParaRPr lang="en-US" dirty="0"/>
           </a:p>
@@ -1121,7 +1123,7 @@
           <a:p>
             <a:fld id="{3AD8CDC4-3D19-4983-B478-82F6B8E5AB66}" type="datetime2">
               <a:rPr lang="en-US" smtClean="0"/>
-              <a:t>Friday, May 5, 2017</a:t>
+              <a:t>Wednesday, June 7, 2017</a:t>
             </a:fld>
             <a:endParaRPr lang="en-US" dirty="0"/>
           </a:p>
@@ -1262,7 +1264,7 @@
           <a:p>
             <a:fld id="{84B82477-D5D3-4181-8C11-75D0F2433A87}" type="datetime2">
               <a:rPr lang="en-US" smtClean="0"/>
-              <a:t>Friday, May 5, 2017</a:t>
+              <a:t>Wednesday, June 7, 2017</a:t>
             </a:fld>
             <a:endParaRPr lang="en-US" dirty="0"/>
           </a:p>
@@ -1913,7 +1915,7 @@
           <a:p>
             <a:fld id="{213E253B-1893-4367-8BAE-DF4BC10DC578}" type="datetime2">
               <a:rPr lang="en-US" smtClean="0"/>
-              <a:t>Friday, May 5, 2017</a:t>
+              <a:t>Wednesday, June 7, 2017</a:t>
             </a:fld>
             <a:endParaRPr lang="en-US" dirty="0"/>
           </a:p>
@@ -2027,7 +2029,7 @@
           <a:p>
             <a:fld id="{8B62300D-25B3-4603-86C9-4CB776489F00}" type="datetime2">
               <a:rPr lang="en-US" smtClean="0"/>
-              <a:t>Friday, May 5, 2017</a:t>
+              <a:t>Wednesday, June 7, 2017</a:t>
             </a:fld>
             <a:endParaRPr lang="en-US" dirty="0"/>
           </a:p>
@@ -2118,7 +2120,7 @@
           <a:p>
             <a:fld id="{C6314AD9-FCC8-48B7-B85B-012A91320DFF}" type="datetime2">
               <a:rPr lang="en-US" smtClean="0"/>
-              <a:t>Friday, May 5, 2017</a:t>
+              <a:t>Wednesday, June 7, 2017</a:t>
             </a:fld>
             <a:endParaRPr lang="en-US" dirty="0"/>
           </a:p>
@@ -2409,7 +2411,7 @@
           <a:p>
             <a:fld id="{3182DC50-D5DB-4F94-B367-9876CD2C4012}" type="datetime2">
               <a:rPr lang="en-US" smtClean="0"/>
-              <a:t>Friday, May 5, 2017</a:t>
+              <a:t>Wednesday, June 7, 2017</a:t>
             </a:fld>
             <a:endParaRPr lang="en-US" dirty="0"/>
           </a:p>
@@ -2733,7 +2735,7 @@
           <a:p>
             <a:fld id="{292EB412-E790-42EA-81FE-2925D3A43D91}" type="datetime2">
               <a:rPr lang="en-US" smtClean="0"/>
-              <a:t>Friday, May 5, 2017</a:t>
+              <a:t>Wednesday, June 7, 2017</a:t>
             </a:fld>
             <a:endParaRPr lang="en-US" dirty="0"/>
           </a:p>
@@ -3191,7 +3193,7 @@
           <a:p>
             <a:fld id="{0B385921-A91A-409C-921C-0E0EC1E750EC}" type="datetime2">
               <a:rPr lang="en-US" smtClean="0"/>
-              <a:t>Friday, May 5, 2017</a:t>
+              <a:t>Wednesday, June 7, 2017</a:t>
             </a:fld>
             <a:endParaRPr lang="en-US" dirty="0"/>
           </a:p>
@@ -3753,7 +3755,15 @@
           <a:p>
             <a:r>
               <a:rPr lang="id-ID" dirty="0" smtClean="0"/>
-              <a:t>By Dimas Rizky H.P.</a:t>
+              <a:t>By Dimas Rizky H.P</a:t>
+            </a:r>
+            <a:r>
+              <a:rPr lang="id-ID" dirty="0" smtClean="0"/>
+              <a:t>. </a:t>
+            </a:r>
+            <a:r>
+              <a:rPr lang="id-ID" smtClean="0"/>
+              <a:t>(2110141011)</a:t>
             </a:r>
             <a:endParaRPr lang="en-US" dirty="0"/>
           </a:p>
@@ -3776,7 +3786,7 @@
           <a:p>
             <a:fld id="{2069C06D-4ED8-42C6-905D-CA84CA1B6CBF}" type="datetime2">
               <a:rPr lang="en-US" smtClean="0"/>
-              <a:t>Friday, May 5, 2017</a:t>
+              <a:t>Wednesday, June 7, 2017</a:t>
             </a:fld>
             <a:endParaRPr lang="en-US" dirty="0"/>
           </a:p>
@@ -3835,6 +3845,25 @@
   <p:clrMapOvr>
     <a:masterClrMapping/>
   </p:clrMapOvr>
+  <mc:AlternateContent xmlns:mc="http://schemas.openxmlformats.org/markup-compatibility/2006">
+    <mc:Choice xmlns:p14="http://schemas.microsoft.com/office/powerpoint/2010/main" Requires="p14">
+      <p:transition spd="med" p14:dur="700">
+        <p:fade/>
+      </p:transition>
+    </mc:Choice>
+    <mc:Fallback>
+      <p:transition spd="med">
+        <p:fade/>
+      </p:transition>
+    </mc:Fallback>
+  </mc:AlternateContent>
+  <p:timing>
+    <p:tnLst>
+      <p:par>
+        <p:cTn id="1" dur="indefinite" restart="never" nodeType="tmRoot"/>
+      </p:par>
+    </p:tnLst>
+  </p:timing>
 </p:sld>
 </file>
 
@@ -3868,7 +3897,7 @@
         <p:spPr/>
         <p:txBody>
           <a:bodyPr>
-            <a:normAutofit/>
+            <a:normAutofit fontScale="92500" lnSpcReduction="10000"/>
           </a:bodyPr>
           <a:lstStyle/>
           <a:p>
@@ -3897,6 +3926,16 @@
               <a:rPr lang="id-ID" sz="2800" dirty="0" smtClean="0"/>
               <a:t>Problem</a:t>
             </a:r>
+          </a:p>
+          <a:p>
+            <a:pPr marL="475488" indent="-457200">
+              <a:buAutoNum type="arabicPeriod"/>
+            </a:pPr>
+            <a:r>
+              <a:rPr lang="id-ID" sz="2800" dirty="0" smtClean="0"/>
+              <a:t>Illustration</a:t>
+            </a:r>
+            <a:endParaRPr lang="id-ID" sz="2800" dirty="0" smtClean="0"/>
           </a:p>
           <a:p>
             <a:pPr marL="475488" indent="-457200">
@@ -3964,7 +4003,7 @@
           <a:p>
             <a:fld id="{14CB1CAA-32CD-4B55-B92A-B8F0843CACF4}" type="datetime2">
               <a:rPr lang="en-US" smtClean="0"/>
-              <a:t>Friday, May 5, 2017</a:t>
+              <a:t>Wednesday, June 7, 2017</a:t>
             </a:fld>
             <a:endParaRPr lang="en-US" dirty="0"/>
           </a:p>
@@ -4023,6 +4062,13 @@
   <p:clrMapOvr>
     <a:masterClrMapping/>
   </p:clrMapOvr>
+  <p:timing>
+    <p:tnLst>
+      <p:par>
+        <p:cTn id="1" dur="indefinite" restart="never" nodeType="tmRoot"/>
+      </p:par>
+    </p:tnLst>
+  </p:timing>
 </p:sld>
 </file>
 
@@ -4071,11 +4117,7 @@
             </a:pPr>
             <a:r>
               <a:rPr lang="id-ID" dirty="0" smtClean="0"/>
-              <a:t>Mata Garuda, snort-based </a:t>
-            </a:r>
-            <a:r>
-              <a:rPr lang="id-ID" dirty="0" smtClean="0"/>
-              <a:t>NIDS</a:t>
+              <a:t>Mata Garuda, snort-based NIDS</a:t>
             </a:r>
           </a:p>
           <a:p>
@@ -4087,7 +4129,6 @@
               <a:rPr lang="id-ID" dirty="0" smtClean="0"/>
               <a:t>Snort-based Mata Garuda is using signature base technique to detect the malicious activity</a:t>
             </a:r>
-            <a:endParaRPr lang="id-ID" dirty="0" smtClean="0"/>
           </a:p>
           <a:p>
             <a:pPr>
@@ -4096,21 +4137,8 @@
             </a:pPr>
             <a:r>
               <a:rPr lang="id-ID" dirty="0" smtClean="0"/>
-              <a:t>It still n</a:t>
-            </a:r>
-            <a:r>
-              <a:rPr lang="id-ID" dirty="0" smtClean="0"/>
-              <a:t>eeds </a:t>
-            </a:r>
-            <a:r>
-              <a:rPr lang="id-ID" dirty="0" smtClean="0"/>
-              <a:t>15 minutes to fetch the </a:t>
-            </a:r>
-            <a:r>
-              <a:rPr lang="id-ID" dirty="0" smtClean="0"/>
-              <a:t>log and refreshing the graphical log</a:t>
-            </a:r>
-            <a:endParaRPr lang="id-ID" dirty="0" smtClean="0"/>
+              <a:t>It still needs 15 minutes to fetch the log and refreshing the graphical log</a:t>
+            </a:r>
           </a:p>
           <a:p>
             <a:pPr marL="18288" indent="0">
@@ -4160,7 +4188,7 @@
           <a:p>
             <a:fld id="{14CB1CAA-32CD-4B55-B92A-B8F0843CACF4}" type="datetime2">
               <a:rPr lang="en-US" smtClean="0"/>
-              <a:t>Friday, May 5, 2017</a:t>
+              <a:t>Wednesday, June 7, 2017</a:t>
             </a:fld>
             <a:endParaRPr lang="en-US" dirty="0"/>
           </a:p>
@@ -4219,6 +4247,13 @@
   <p:clrMapOvr>
     <a:masterClrMapping/>
   </p:clrMapOvr>
+  <p:timing>
+    <p:tnLst>
+      <p:par>
+        <p:cTn id="1" dur="indefinite" restart="never" nodeType="tmRoot"/>
+      </p:par>
+    </p:tnLst>
+  </p:timing>
 </p:sld>
 </file>
 
@@ -4281,7 +4316,7 @@
             </a:r>
             <a:r>
               <a:rPr lang="id-ID" dirty="0" smtClean="0"/>
-              <a:t>self-monitoring activit</a:t>
+              <a:t>self-monitoring activities</a:t>
             </a:r>
           </a:p>
           <a:p>
@@ -4343,7 +4378,7 @@
           <a:p>
             <a:fld id="{14CB1CAA-32CD-4B55-B92A-B8F0843CACF4}" type="datetime2">
               <a:rPr lang="en-US" smtClean="0"/>
-              <a:t>Friday, May 5, 2017</a:t>
+              <a:t>Wednesday, June 7, 2017</a:t>
             </a:fld>
             <a:endParaRPr lang="en-US" dirty="0"/>
           </a:p>
@@ -4402,6 +4437,13 @@
   <p:clrMapOvr>
     <a:masterClrMapping/>
   </p:clrMapOvr>
+  <p:timing>
+    <p:tnLst>
+      <p:par>
+        <p:cTn id="1" dur="indefinite" restart="never" nodeType="tmRoot"/>
+      </p:par>
+    </p:tnLst>
+  </p:timing>
 </p:sld>
 </file>
 
@@ -4448,11 +4490,23 @@
             </a:pPr>
             <a:r>
               <a:rPr lang="id-ID" dirty="0" smtClean="0"/>
-              <a:t>Mata Garuda </a:t>
+              <a:t>Mata Garuda already implemented </a:t>
             </a:r>
             <a:r>
               <a:rPr lang="id-ID" dirty="0" smtClean="0"/>
-              <a:t>already implemented by graphical log monitoring</a:t>
+              <a:t>the</a:t>
+            </a:r>
+            <a:r>
+              <a:rPr lang="id-ID" dirty="0" smtClean="0"/>
+              <a:t> </a:t>
+            </a:r>
+            <a:r>
+              <a:rPr lang="id-ID" dirty="0" smtClean="0"/>
+              <a:t>graphical log </a:t>
+            </a:r>
+            <a:r>
+              <a:rPr lang="id-ID" dirty="0" smtClean="0"/>
+              <a:t>monitoring system</a:t>
             </a:r>
             <a:endParaRPr lang="id-ID" dirty="0" smtClean="0"/>
           </a:p>
@@ -4475,7 +4529,6 @@
               <a:rPr lang="id-ID" dirty="0" smtClean="0"/>
               <a:t>The time needed to recognize the threat is should be short enough.</a:t>
             </a:r>
-            <a:endParaRPr lang="id-ID" dirty="0" smtClean="0"/>
           </a:p>
           <a:p>
             <a:pPr>
@@ -4509,11 +4562,7 @@
           <a:p>
             <a:r>
               <a:rPr lang="id-ID" sz="4400" dirty="0" smtClean="0"/>
-              <a:t>Background </a:t>
-            </a:r>
-            <a:r>
-              <a:rPr lang="id-ID" sz="4400" dirty="0" smtClean="0"/>
-              <a:t>– Problem</a:t>
+              <a:t>Background – Problem</a:t>
             </a:r>
             <a:endParaRPr lang="en-US" sz="4400" dirty="0"/>
           </a:p>
@@ -4536,7 +4585,7 @@
           <a:p>
             <a:fld id="{14CB1CAA-32CD-4B55-B92A-B8F0843CACF4}" type="datetime2">
               <a:rPr lang="en-US" smtClean="0"/>
-              <a:t>Friday, May 5, 2017</a:t>
+              <a:t>Wednesday, June 7, 2017</a:t>
             </a:fld>
             <a:endParaRPr lang="en-US" dirty="0"/>
           </a:p>
@@ -4595,6 +4644,13 @@
   <p:clrMapOvr>
     <a:masterClrMapping/>
   </p:clrMapOvr>
+  <p:timing>
+    <p:tnLst>
+      <p:par>
+        <p:cTn id="1" dur="indefinite" restart="never" nodeType="tmRoot"/>
+      </p:par>
+    </p:tnLst>
+  </p:timing>
 </p:sld>
 </file>
 
@@ -4692,7 +4748,7 @@
           <a:p>
             <a:fld id="{14CB1CAA-32CD-4B55-B92A-B8F0843CACF4}" type="datetime2">
               <a:rPr lang="en-US" smtClean="0"/>
-              <a:t>Friday, May 5, 2017</a:t>
+              <a:t>Wednesday, June 7, 2017</a:t>
             </a:fld>
             <a:endParaRPr lang="en-US" dirty="0"/>
           </a:p>
@@ -4751,6 +4807,13 @@
   <p:clrMapOvr>
     <a:masterClrMapping/>
   </p:clrMapOvr>
+  <p:timing>
+    <p:tnLst>
+      <p:par>
+        <p:cTn id="1" dur="indefinite" restart="never" nodeType="tmRoot"/>
+      </p:par>
+    </p:tnLst>
+  </p:timing>
 </p:sld>
 </file>
 
@@ -4771,6 +4834,3628 @@
           <a:chExt cx="0" cy="0"/>
         </a:xfrm>
       </p:grpSpPr>
+      <p:pic>
+        <p:nvPicPr>
+          <p:cNvPr id="1040" name="Picture 16"/>
+          <p:cNvPicPr>
+            <a:picLocks noChangeAspect="1" noChangeArrowheads="1"/>
+          </p:cNvPicPr>
+          <p:nvPr/>
+        </p:nvPicPr>
+        <p:blipFill>
+          <a:blip r:embed="rId2">
+            <a:extLst>
+              <a:ext uri="{28A0092B-C50C-407E-A947-70E740481C1C}">
+                <a14:useLocalDpi xmlns:a14="http://schemas.microsoft.com/office/drawing/2010/main" val="0"/>
+              </a:ext>
+            </a:extLst>
+          </a:blip>
+          <a:srcRect/>
+          <a:stretch>
+            <a:fillRect/>
+          </a:stretch>
+        </p:blipFill>
+        <p:spPr bwMode="auto">
+          <a:xfrm>
+            <a:off x="27883" y="284627"/>
+            <a:ext cx="2146424" cy="1033463"/>
+          </a:xfrm>
+          <a:prstGeom prst="rect">
+            <a:avLst/>
+          </a:prstGeom>
+          <a:noFill/>
+          <a:ln>
+            <a:noFill/>
+          </a:ln>
+          <a:effectLst/>
+          <a:extLst>
+            <a:ext uri="{909E8E84-426E-40DD-AFC4-6F175D3DCCD1}">
+              <a14:hiddenFill xmlns:a14="http://schemas.microsoft.com/office/drawing/2010/main">
+                <a:solidFill>
+                  <a:schemeClr val="accent1"/>
+                </a:solidFill>
+              </a14:hiddenFill>
+            </a:ext>
+            <a:ext uri="{91240B29-F687-4F45-9708-019B960494DF}">
+              <a14:hiddenLine xmlns:a14="http://schemas.microsoft.com/office/drawing/2010/main" w="9525">
+                <a:solidFill>
+                  <a:schemeClr val="tx1"/>
+                </a:solidFill>
+                <a:miter lim="800000"/>
+                <a:headEnd/>
+                <a:tailEnd/>
+              </a14:hiddenLine>
+            </a:ext>
+            <a:ext uri="{AF507438-7753-43E0-B8FC-AC1667EBCBE1}">
+              <a14:hiddenEffects xmlns:a14="http://schemas.microsoft.com/office/drawing/2010/main">
+                <a:effectLst>
+                  <a:outerShdw dist="35921" dir="2700000" algn="ctr" rotWithShape="0">
+                    <a:schemeClr val="bg2"/>
+                  </a:outerShdw>
+                </a:effectLst>
+              </a14:hiddenEffects>
+            </a:ext>
+          </a:extLst>
+        </p:spPr>
+      </p:pic>
+      <p:pic>
+        <p:nvPicPr>
+          <p:cNvPr id="1041" name="Picture 17"/>
+          <p:cNvPicPr>
+            <a:picLocks noChangeAspect="1" noChangeArrowheads="1"/>
+          </p:cNvPicPr>
+          <p:nvPr/>
+        </p:nvPicPr>
+        <p:blipFill rotWithShape="1">
+          <a:blip r:embed="rId3" cstate="print">
+            <a:extLst>
+              <a:ext uri="{28A0092B-C50C-407E-A947-70E740481C1C}">
+                <a14:useLocalDpi xmlns:a14="http://schemas.microsoft.com/office/drawing/2010/main" val="0"/>
+              </a:ext>
+            </a:extLst>
+          </a:blip>
+          <a:srcRect l="13021"/>
+          <a:stretch/>
+        </p:blipFill>
+        <p:spPr bwMode="auto">
+          <a:xfrm>
+            <a:off x="6432533" y="159171"/>
+            <a:ext cx="2088232" cy="1260451"/>
+          </a:xfrm>
+          <a:prstGeom prst="rect">
+            <a:avLst/>
+          </a:prstGeom>
+          <a:noFill/>
+          <a:ln>
+            <a:noFill/>
+          </a:ln>
+          <a:effectLst/>
+          <a:extLst>
+            <a:ext uri="{909E8E84-426E-40DD-AFC4-6F175D3DCCD1}">
+              <a14:hiddenFill xmlns:a14="http://schemas.microsoft.com/office/drawing/2010/main">
+                <a:solidFill>
+                  <a:schemeClr val="accent1"/>
+                </a:solidFill>
+              </a14:hiddenFill>
+            </a:ext>
+            <a:ext uri="{91240B29-F687-4F45-9708-019B960494DF}">
+              <a14:hiddenLine xmlns:a14="http://schemas.microsoft.com/office/drawing/2010/main" w="9525">
+                <a:solidFill>
+                  <a:schemeClr val="tx1"/>
+                </a:solidFill>
+                <a:miter lim="800000"/>
+                <a:headEnd/>
+                <a:tailEnd/>
+              </a14:hiddenLine>
+            </a:ext>
+            <a:ext uri="{AF507438-7753-43E0-B8FC-AC1667EBCBE1}">
+              <a14:hiddenEffects xmlns:a14="http://schemas.microsoft.com/office/drawing/2010/main">
+                <a:effectLst>
+                  <a:outerShdw dist="35921" dir="2700000" algn="ctr" rotWithShape="0">
+                    <a:schemeClr val="bg2"/>
+                  </a:outerShdw>
+                </a:effectLst>
+              </a14:hiddenEffects>
+            </a:ext>
+          </a:extLst>
+        </p:spPr>
+      </p:pic>
+      <p:pic>
+        <p:nvPicPr>
+          <p:cNvPr id="1039" name="Picture 15"/>
+          <p:cNvPicPr>
+            <a:picLocks noChangeAspect="1" noChangeArrowheads="1"/>
+          </p:cNvPicPr>
+          <p:nvPr/>
+        </p:nvPicPr>
+        <p:blipFill>
+          <a:blip r:embed="rId4">
+            <a:extLst>
+              <a:ext uri="{28A0092B-C50C-407E-A947-70E740481C1C}">
+                <a14:useLocalDpi xmlns:a14="http://schemas.microsoft.com/office/drawing/2010/main" val="0"/>
+              </a:ext>
+            </a:extLst>
+          </a:blip>
+          <a:srcRect/>
+          <a:stretch>
+            <a:fillRect/>
+          </a:stretch>
+        </p:blipFill>
+        <p:spPr bwMode="auto">
+          <a:xfrm>
+            <a:off x="155575" y="230423"/>
+            <a:ext cx="1891040" cy="1064801"/>
+          </a:xfrm>
+          <a:prstGeom prst="rect">
+            <a:avLst/>
+          </a:prstGeom>
+          <a:noFill/>
+          <a:ln>
+            <a:noFill/>
+          </a:ln>
+          <a:effectLst/>
+          <a:extLst>
+            <a:ext uri="{909E8E84-426E-40DD-AFC4-6F175D3DCCD1}">
+              <a14:hiddenFill xmlns:a14="http://schemas.microsoft.com/office/drawing/2010/main">
+                <a:solidFill>
+                  <a:schemeClr val="accent1"/>
+                </a:solidFill>
+              </a14:hiddenFill>
+            </a:ext>
+            <a:ext uri="{91240B29-F687-4F45-9708-019B960494DF}">
+              <a14:hiddenLine xmlns:a14="http://schemas.microsoft.com/office/drawing/2010/main" w="9525">
+                <a:solidFill>
+                  <a:schemeClr val="tx1"/>
+                </a:solidFill>
+                <a:miter lim="800000"/>
+                <a:headEnd/>
+                <a:tailEnd/>
+              </a14:hiddenLine>
+            </a:ext>
+            <a:ext uri="{AF507438-7753-43E0-B8FC-AC1667EBCBE1}">
+              <a14:hiddenEffects xmlns:a14="http://schemas.microsoft.com/office/drawing/2010/main">
+                <a:effectLst>
+                  <a:outerShdw dist="35921" dir="2700000" algn="ctr" rotWithShape="0">
+                    <a:schemeClr val="bg2"/>
+                  </a:outerShdw>
+                </a:effectLst>
+              </a14:hiddenEffects>
+            </a:ext>
+          </a:extLst>
+        </p:spPr>
+      </p:pic>
+      <p:pic>
+        <p:nvPicPr>
+          <p:cNvPr id="1038" name="Picture 14"/>
+          <p:cNvPicPr>
+            <a:picLocks noChangeAspect="1" noChangeArrowheads="1"/>
+          </p:cNvPicPr>
+          <p:nvPr/>
+        </p:nvPicPr>
+        <p:blipFill>
+          <a:blip r:embed="rId5">
+            <a:extLst>
+              <a:ext uri="{28A0092B-C50C-407E-A947-70E740481C1C}">
+                <a14:useLocalDpi xmlns:a14="http://schemas.microsoft.com/office/drawing/2010/main" val="0"/>
+              </a:ext>
+            </a:extLst>
+          </a:blip>
+          <a:srcRect/>
+          <a:stretch>
+            <a:fillRect/>
+          </a:stretch>
+        </p:blipFill>
+        <p:spPr bwMode="auto">
+          <a:xfrm>
+            <a:off x="6206043" y="160338"/>
+            <a:ext cx="2409944" cy="1204972"/>
+          </a:xfrm>
+          <a:prstGeom prst="rect">
+            <a:avLst/>
+          </a:prstGeom>
+          <a:noFill/>
+          <a:ln>
+            <a:noFill/>
+          </a:ln>
+          <a:effectLst/>
+          <a:extLst>
+            <a:ext uri="{909E8E84-426E-40DD-AFC4-6F175D3DCCD1}">
+              <a14:hiddenFill xmlns:a14="http://schemas.microsoft.com/office/drawing/2010/main">
+                <a:solidFill>
+                  <a:schemeClr val="accent1"/>
+                </a:solidFill>
+              </a14:hiddenFill>
+            </a:ext>
+            <a:ext uri="{91240B29-F687-4F45-9708-019B960494DF}">
+              <a14:hiddenLine xmlns:a14="http://schemas.microsoft.com/office/drawing/2010/main" w="9525">
+                <a:solidFill>
+                  <a:schemeClr val="tx1"/>
+                </a:solidFill>
+                <a:miter lim="800000"/>
+                <a:headEnd/>
+                <a:tailEnd/>
+              </a14:hiddenLine>
+            </a:ext>
+            <a:ext uri="{AF507438-7753-43E0-B8FC-AC1667EBCBE1}">
+              <a14:hiddenEffects xmlns:a14="http://schemas.microsoft.com/office/drawing/2010/main">
+                <a:effectLst>
+                  <a:outerShdw dist="35921" dir="2700000" algn="ctr" rotWithShape="0">
+                    <a:schemeClr val="bg2"/>
+                  </a:outerShdw>
+                </a:effectLst>
+              </a14:hiddenEffects>
+            </a:ext>
+          </a:extLst>
+        </p:spPr>
+      </p:pic>
+      <p:sp>
+        <p:nvSpPr>
+          <p:cNvPr id="14" name="Rectangle 13"/>
+          <p:cNvSpPr/>
+          <p:nvPr/>
+        </p:nvSpPr>
+        <p:spPr>
+          <a:xfrm>
+            <a:off x="3923928" y="304741"/>
+            <a:ext cx="88561" cy="682833"/>
+          </a:xfrm>
+          <a:prstGeom prst="rect">
+            <a:avLst/>
+          </a:prstGeom>
+        </p:spPr>
+        <p:style>
+          <a:lnRef idx="2">
+            <a:schemeClr val="accent1">
+              <a:shade val="50000"/>
+            </a:schemeClr>
+          </a:lnRef>
+          <a:fillRef idx="1">
+            <a:schemeClr val="accent1"/>
+          </a:fillRef>
+          <a:effectRef idx="0">
+            <a:schemeClr val="accent1"/>
+          </a:effectRef>
+          <a:fontRef idx="minor">
+            <a:schemeClr val="lt1"/>
+          </a:fontRef>
+        </p:style>
+        <p:txBody>
+          <a:bodyPr rtlCol="0" anchor="ctr"/>
+          <a:lstStyle/>
+          <a:p>
+            <a:pPr algn="ctr"/>
+            <a:endParaRPr lang="en-US"/>
+          </a:p>
+        </p:txBody>
+      </p:sp>
+      <p:sp>
+        <p:nvSpPr>
+          <p:cNvPr id="3" name="Title 2"/>
+          <p:cNvSpPr>
+            <a:spLocks noGrp="1"/>
+          </p:cNvSpPr>
+          <p:nvPr>
+            <p:ph type="title"/>
+          </p:nvPr>
+        </p:nvSpPr>
+        <p:spPr/>
+        <p:txBody>
+          <a:bodyPr/>
+          <a:lstStyle/>
+          <a:p>
+            <a:r>
+              <a:rPr lang="id-ID" dirty="0" smtClean="0"/>
+              <a:t>Illustration</a:t>
+            </a:r>
+            <a:endParaRPr lang="en-US" dirty="0"/>
+          </a:p>
+        </p:txBody>
+      </p:sp>
+      <p:sp>
+        <p:nvSpPr>
+          <p:cNvPr id="4" name="Date Placeholder 3"/>
+          <p:cNvSpPr>
+            <a:spLocks noGrp="1"/>
+          </p:cNvSpPr>
+          <p:nvPr>
+            <p:ph type="dt" sz="half" idx="10"/>
+          </p:nvPr>
+        </p:nvSpPr>
+        <p:spPr/>
+        <p:txBody>
+          <a:bodyPr/>
+          <a:lstStyle/>
+          <a:p>
+            <a:fld id="{14CB1CAA-32CD-4B55-B92A-B8F0843CACF4}" type="datetime2">
+              <a:rPr lang="en-US" smtClean="0"/>
+              <a:t>Wednesday, June 7, 2017</a:t>
+            </a:fld>
+            <a:endParaRPr lang="en-US" dirty="0"/>
+          </a:p>
+        </p:txBody>
+      </p:sp>
+      <p:sp>
+        <p:nvSpPr>
+          <p:cNvPr id="5" name="Slide Number Placeholder 4"/>
+          <p:cNvSpPr>
+            <a:spLocks noGrp="1"/>
+          </p:cNvSpPr>
+          <p:nvPr>
+            <p:ph type="sldNum" sz="quarter" idx="11"/>
+          </p:nvPr>
+        </p:nvSpPr>
+        <p:spPr/>
+        <p:txBody>
+          <a:bodyPr/>
+          <a:lstStyle/>
+          <a:p>
+            <a:fld id="{1789C0F2-17E0-497A-9BBE-0C73201AAFE3}" type="slidenum">
+              <a:rPr lang="en-US" smtClean="0"/>
+              <a:pPr/>
+              <a:t>7</a:t>
+            </a:fld>
+            <a:endParaRPr lang="en-US" dirty="0"/>
+          </a:p>
+        </p:txBody>
+      </p:sp>
+      <p:sp>
+        <p:nvSpPr>
+          <p:cNvPr id="6" name="Footer Placeholder 5"/>
+          <p:cNvSpPr>
+            <a:spLocks noGrp="1"/>
+          </p:cNvSpPr>
+          <p:nvPr>
+            <p:ph type="ftr" sz="quarter" idx="12"/>
+          </p:nvPr>
+        </p:nvSpPr>
+        <p:spPr/>
+        <p:txBody>
+          <a:bodyPr/>
+          <a:lstStyle/>
+          <a:p>
+            <a:endParaRPr lang="en-US" dirty="0"/>
+          </a:p>
+        </p:txBody>
+      </p:sp>
+      <p:sp>
+        <p:nvSpPr>
+          <p:cNvPr id="7" name="AutoShape 2" descr="Hasil gambar untuk terrorist house"/>
+          <p:cNvSpPr>
+            <a:spLocks noChangeAspect="1" noChangeArrowheads="1"/>
+          </p:cNvSpPr>
+          <p:nvPr/>
+        </p:nvSpPr>
+        <p:spPr bwMode="auto">
+          <a:xfrm>
+            <a:off x="155575" y="-144463"/>
+            <a:ext cx="304800" cy="304801"/>
+          </a:xfrm>
+          <a:prstGeom prst="rect">
+            <a:avLst/>
+          </a:prstGeom>
+          <a:noFill/>
+          <a:extLst>
+            <a:ext uri="{909E8E84-426E-40DD-AFC4-6F175D3DCCD1}">
+              <a14:hiddenFill xmlns:a14="http://schemas.microsoft.com/office/drawing/2010/main">
+                <a:solidFill>
+                  <a:srgbClr val="FFFFFF"/>
+                </a:solidFill>
+              </a14:hiddenFill>
+            </a:ext>
+          </a:extLst>
+        </p:spPr>
+        <p:txBody>
+          <a:bodyPr vert="horz" wrap="square" lIns="91440" tIns="45720" rIns="91440" bIns="45720" numCol="1" anchor="t" anchorCtr="0" compatLnSpc="1">
+            <a:prstTxWarp prst="textNoShape">
+              <a:avLst/>
+            </a:prstTxWarp>
+          </a:bodyPr>
+          <a:lstStyle/>
+          <a:p>
+            <a:endParaRPr lang="en-US"/>
+          </a:p>
+        </p:txBody>
+      </p:sp>
+      <p:pic>
+        <p:nvPicPr>
+          <p:cNvPr id="1027" name="Picture 3"/>
+          <p:cNvPicPr>
+            <a:picLocks noChangeAspect="1" noChangeArrowheads="1"/>
+          </p:cNvPicPr>
+          <p:nvPr/>
+        </p:nvPicPr>
+        <p:blipFill>
+          <a:blip r:embed="rId6">
+            <a:extLst>
+              <a:ext uri="{28A0092B-C50C-407E-A947-70E740481C1C}">
+                <a14:useLocalDpi xmlns:a14="http://schemas.microsoft.com/office/drawing/2010/main" val="0"/>
+              </a:ext>
+            </a:extLst>
+          </a:blip>
+          <a:srcRect/>
+          <a:stretch>
+            <a:fillRect/>
+          </a:stretch>
+        </p:blipFill>
+        <p:spPr bwMode="auto">
+          <a:xfrm>
+            <a:off x="333091" y="231533"/>
+            <a:ext cx="1675652" cy="1115070"/>
+          </a:xfrm>
+          <a:prstGeom prst="rect">
+            <a:avLst/>
+          </a:prstGeom>
+          <a:noFill/>
+          <a:ln>
+            <a:noFill/>
+          </a:ln>
+          <a:effectLst/>
+          <a:extLst>
+            <a:ext uri="{909E8E84-426E-40DD-AFC4-6F175D3DCCD1}">
+              <a14:hiddenFill xmlns:a14="http://schemas.microsoft.com/office/drawing/2010/main">
+                <a:solidFill>
+                  <a:schemeClr val="accent1"/>
+                </a:solidFill>
+              </a14:hiddenFill>
+            </a:ext>
+            <a:ext uri="{91240B29-F687-4F45-9708-019B960494DF}">
+              <a14:hiddenLine xmlns:a14="http://schemas.microsoft.com/office/drawing/2010/main" w="9525">
+                <a:solidFill>
+                  <a:schemeClr val="tx1"/>
+                </a:solidFill>
+                <a:miter lim="800000"/>
+                <a:headEnd/>
+                <a:tailEnd/>
+              </a14:hiddenLine>
+            </a:ext>
+            <a:ext uri="{AF507438-7753-43E0-B8FC-AC1667EBCBE1}">
+              <a14:hiddenEffects xmlns:a14="http://schemas.microsoft.com/office/drawing/2010/main">
+                <a:effectLst>
+                  <a:outerShdw dist="35921" dir="2700000" algn="ctr" rotWithShape="0">
+                    <a:schemeClr val="bg2"/>
+                  </a:outerShdw>
+                </a:effectLst>
+              </a14:hiddenEffects>
+            </a:ext>
+          </a:extLst>
+        </p:spPr>
+      </p:pic>
+      <p:pic>
+        <p:nvPicPr>
+          <p:cNvPr id="1028" name="Picture 4"/>
+          <p:cNvPicPr>
+            <a:picLocks noChangeAspect="1" noChangeArrowheads="1"/>
+          </p:cNvPicPr>
+          <p:nvPr/>
+        </p:nvPicPr>
+        <p:blipFill>
+          <a:blip r:embed="rId7" cstate="print">
+            <a:extLst>
+              <a:ext uri="{28A0092B-C50C-407E-A947-70E740481C1C}">
+                <a14:useLocalDpi xmlns:a14="http://schemas.microsoft.com/office/drawing/2010/main" val="0"/>
+              </a:ext>
+            </a:extLst>
+          </a:blip>
+          <a:srcRect/>
+          <a:stretch>
+            <a:fillRect/>
+          </a:stretch>
+        </p:blipFill>
+        <p:spPr bwMode="auto">
+          <a:xfrm>
+            <a:off x="6444208" y="160338"/>
+            <a:ext cx="2123943" cy="1115070"/>
+          </a:xfrm>
+          <a:prstGeom prst="rect">
+            <a:avLst/>
+          </a:prstGeom>
+          <a:noFill/>
+          <a:ln>
+            <a:noFill/>
+          </a:ln>
+          <a:effectLst/>
+          <a:extLst>
+            <a:ext uri="{909E8E84-426E-40DD-AFC4-6F175D3DCCD1}">
+              <a14:hiddenFill xmlns:a14="http://schemas.microsoft.com/office/drawing/2010/main">
+                <a:solidFill>
+                  <a:schemeClr val="accent1"/>
+                </a:solidFill>
+              </a14:hiddenFill>
+            </a:ext>
+            <a:ext uri="{91240B29-F687-4F45-9708-019B960494DF}">
+              <a14:hiddenLine xmlns:a14="http://schemas.microsoft.com/office/drawing/2010/main" w="9525">
+                <a:solidFill>
+                  <a:schemeClr val="tx1"/>
+                </a:solidFill>
+                <a:miter lim="800000"/>
+                <a:headEnd/>
+                <a:tailEnd/>
+              </a14:hiddenLine>
+            </a:ext>
+            <a:ext uri="{AF507438-7753-43E0-B8FC-AC1667EBCBE1}">
+              <a14:hiddenEffects xmlns:a14="http://schemas.microsoft.com/office/drawing/2010/main">
+                <a:effectLst>
+                  <a:outerShdw dist="35921" dir="2700000" algn="ctr" rotWithShape="0">
+                    <a:schemeClr val="bg2"/>
+                  </a:outerShdw>
+                </a:effectLst>
+              </a14:hiddenEffects>
+            </a:ext>
+          </a:extLst>
+        </p:spPr>
+      </p:pic>
+      <p:pic>
+        <p:nvPicPr>
+          <p:cNvPr id="1029" name="Picture 5"/>
+          <p:cNvPicPr>
+            <a:picLocks noChangeAspect="1" noChangeArrowheads="1"/>
+          </p:cNvPicPr>
+          <p:nvPr/>
+        </p:nvPicPr>
+        <p:blipFill>
+          <a:blip r:embed="rId8" cstate="print">
+            <a:clrChange>
+              <a:clrFrom>
+                <a:srgbClr val="FFFFFF"/>
+              </a:clrFrom>
+              <a:clrTo>
+                <a:srgbClr val="FFFFFF">
+                  <a:alpha val="0"/>
+                </a:srgbClr>
+              </a:clrTo>
+            </a:clrChange>
+            <a:extLst>
+              <a:ext uri="{28A0092B-C50C-407E-A947-70E740481C1C}">
+                <a14:useLocalDpi xmlns:a14="http://schemas.microsoft.com/office/drawing/2010/main" val="0"/>
+              </a:ext>
+            </a:extLst>
+          </a:blip>
+          <a:srcRect/>
+          <a:stretch>
+            <a:fillRect/>
+          </a:stretch>
+        </p:blipFill>
+        <p:spPr bwMode="auto">
+          <a:xfrm>
+            <a:off x="2008743" y="304741"/>
+            <a:ext cx="815871" cy="897458"/>
+          </a:xfrm>
+          <a:prstGeom prst="rect">
+            <a:avLst/>
+          </a:prstGeom>
+          <a:noFill/>
+          <a:ln>
+            <a:noFill/>
+          </a:ln>
+          <a:effectLst/>
+          <a:extLst>
+            <a:ext uri="{909E8E84-426E-40DD-AFC4-6F175D3DCCD1}">
+              <a14:hiddenFill xmlns:a14="http://schemas.microsoft.com/office/drawing/2010/main">
+                <a:solidFill>
+                  <a:schemeClr val="accent1"/>
+                </a:solidFill>
+              </a14:hiddenFill>
+            </a:ext>
+            <a:ext uri="{91240B29-F687-4F45-9708-019B960494DF}">
+              <a14:hiddenLine xmlns:a14="http://schemas.microsoft.com/office/drawing/2010/main" w="9525">
+                <a:solidFill>
+                  <a:schemeClr val="tx1"/>
+                </a:solidFill>
+                <a:miter lim="800000"/>
+                <a:headEnd/>
+                <a:tailEnd/>
+              </a14:hiddenLine>
+            </a:ext>
+            <a:ext uri="{AF507438-7753-43E0-B8FC-AC1667EBCBE1}">
+              <a14:hiddenEffects xmlns:a14="http://schemas.microsoft.com/office/drawing/2010/main">
+                <a:effectLst>
+                  <a:outerShdw dist="35921" dir="2700000" algn="ctr" rotWithShape="0">
+                    <a:schemeClr val="bg2"/>
+                  </a:outerShdw>
+                </a:effectLst>
+              </a14:hiddenEffects>
+            </a:ext>
+          </a:extLst>
+        </p:spPr>
+      </p:pic>
+      <p:cxnSp>
+        <p:nvCxnSpPr>
+          <p:cNvPr id="9" name="Curved Connector 8"/>
+          <p:cNvCxnSpPr>
+            <a:stCxn id="1027" idx="3"/>
+            <a:endCxn id="1028" idx="1"/>
+          </p:cNvCxnSpPr>
+          <p:nvPr/>
+        </p:nvCxnSpPr>
+        <p:spPr>
+          <a:xfrm flipV="1">
+            <a:off x="2008743" y="717873"/>
+            <a:ext cx="4435465" cy="71195"/>
+          </a:xfrm>
+          <a:prstGeom prst="curvedConnector3">
+            <a:avLst>
+              <a:gd name="adj1" fmla="val 18471"/>
+            </a:avLst>
+          </a:prstGeom>
+          <a:ln>
+            <a:headEnd type="arrow"/>
+            <a:tailEnd type="arrow"/>
+          </a:ln>
+        </p:spPr>
+        <p:style>
+          <a:lnRef idx="1">
+            <a:schemeClr val="accent1"/>
+          </a:lnRef>
+          <a:fillRef idx="0">
+            <a:schemeClr val="accent1"/>
+          </a:fillRef>
+          <a:effectRef idx="0">
+            <a:schemeClr val="accent1"/>
+          </a:effectRef>
+          <a:fontRef idx="minor">
+            <a:schemeClr val="tx1"/>
+          </a:fontRef>
+        </p:style>
+      </p:cxnSp>
+      <p:pic>
+        <p:nvPicPr>
+          <p:cNvPr id="1030" name="Picture 6"/>
+          <p:cNvPicPr>
+            <a:picLocks noChangeAspect="1" noChangeArrowheads="1"/>
+          </p:cNvPicPr>
+          <p:nvPr/>
+        </p:nvPicPr>
+        <p:blipFill>
+          <a:blip r:embed="rId9" cstate="print">
+            <a:extLst>
+              <a:ext uri="{28A0092B-C50C-407E-A947-70E740481C1C}">
+                <a14:useLocalDpi xmlns:a14="http://schemas.microsoft.com/office/drawing/2010/main" val="0"/>
+              </a:ext>
+            </a:extLst>
+          </a:blip>
+          <a:srcRect/>
+          <a:stretch>
+            <a:fillRect/>
+          </a:stretch>
+        </p:blipFill>
+        <p:spPr bwMode="auto">
+          <a:xfrm>
+            <a:off x="3491880" y="885453"/>
+            <a:ext cx="1041219" cy="779909"/>
+          </a:xfrm>
+          <a:prstGeom prst="rect">
+            <a:avLst/>
+          </a:prstGeom>
+          <a:noFill/>
+          <a:ln>
+            <a:noFill/>
+          </a:ln>
+          <a:effectLst/>
+          <a:extLst>
+            <a:ext uri="{909E8E84-426E-40DD-AFC4-6F175D3DCCD1}">
+              <a14:hiddenFill xmlns:a14="http://schemas.microsoft.com/office/drawing/2010/main">
+                <a:solidFill>
+                  <a:schemeClr val="accent1"/>
+                </a:solidFill>
+              </a14:hiddenFill>
+            </a:ext>
+            <a:ext uri="{91240B29-F687-4F45-9708-019B960494DF}">
+              <a14:hiddenLine xmlns:a14="http://schemas.microsoft.com/office/drawing/2010/main" w="9525">
+                <a:solidFill>
+                  <a:schemeClr val="tx1"/>
+                </a:solidFill>
+                <a:miter lim="800000"/>
+                <a:headEnd/>
+                <a:tailEnd/>
+              </a14:hiddenLine>
+            </a:ext>
+            <a:ext uri="{AF507438-7753-43E0-B8FC-AC1667EBCBE1}">
+              <a14:hiddenEffects xmlns:a14="http://schemas.microsoft.com/office/drawing/2010/main">
+                <a:effectLst>
+                  <a:outerShdw dist="35921" dir="2700000" algn="ctr" rotWithShape="0">
+                    <a:schemeClr val="bg2"/>
+                  </a:outerShdw>
+                </a:effectLst>
+              </a14:hiddenEffects>
+            </a:ext>
+          </a:extLst>
+        </p:spPr>
+      </p:pic>
+      <p:pic>
+        <p:nvPicPr>
+          <p:cNvPr id="1031" name="Picture 7"/>
+          <p:cNvPicPr>
+            <a:picLocks noChangeAspect="1" noChangeArrowheads="1"/>
+          </p:cNvPicPr>
+          <p:nvPr/>
+        </p:nvPicPr>
+        <p:blipFill>
+          <a:blip r:embed="rId10">
+            <a:extLst>
+              <a:ext uri="{28A0092B-C50C-407E-A947-70E740481C1C}">
+                <a14:useLocalDpi xmlns:a14="http://schemas.microsoft.com/office/drawing/2010/main" val="0"/>
+              </a:ext>
+            </a:extLst>
+          </a:blip>
+          <a:srcRect/>
+          <a:stretch>
+            <a:fillRect/>
+          </a:stretch>
+        </p:blipFill>
+        <p:spPr bwMode="auto">
+          <a:xfrm>
+            <a:off x="3023882" y="1579545"/>
+            <a:ext cx="1888649" cy="1004317"/>
+          </a:xfrm>
+          <a:prstGeom prst="rect">
+            <a:avLst/>
+          </a:prstGeom>
+          <a:noFill/>
+          <a:ln>
+            <a:noFill/>
+          </a:ln>
+          <a:effectLst/>
+          <a:extLst>
+            <a:ext uri="{909E8E84-426E-40DD-AFC4-6F175D3DCCD1}">
+              <a14:hiddenFill xmlns:a14="http://schemas.microsoft.com/office/drawing/2010/main">
+                <a:solidFill>
+                  <a:schemeClr val="accent1"/>
+                </a:solidFill>
+              </a14:hiddenFill>
+            </a:ext>
+            <a:ext uri="{91240B29-F687-4F45-9708-019B960494DF}">
+              <a14:hiddenLine xmlns:a14="http://schemas.microsoft.com/office/drawing/2010/main" w="9525">
+                <a:solidFill>
+                  <a:schemeClr val="tx1"/>
+                </a:solidFill>
+                <a:miter lim="800000"/>
+                <a:headEnd/>
+                <a:tailEnd/>
+              </a14:hiddenLine>
+            </a:ext>
+            <a:ext uri="{AF507438-7753-43E0-B8FC-AC1667EBCBE1}">
+              <a14:hiddenEffects xmlns:a14="http://schemas.microsoft.com/office/drawing/2010/main">
+                <a:effectLst>
+                  <a:outerShdw dist="35921" dir="2700000" algn="ctr" rotWithShape="0">
+                    <a:schemeClr val="bg2"/>
+                  </a:outerShdw>
+                </a:effectLst>
+              </a14:hiddenEffects>
+            </a:ext>
+          </a:extLst>
+        </p:spPr>
+      </p:pic>
+      <p:pic>
+        <p:nvPicPr>
+          <p:cNvPr id="1033" name="Picture 9" descr="Hasil gambar untuk report"/>
+          <p:cNvPicPr>
+            <a:picLocks noChangeAspect="1" noChangeArrowheads="1"/>
+          </p:cNvPicPr>
+          <p:nvPr/>
+        </p:nvPicPr>
+        <p:blipFill>
+          <a:blip r:embed="rId11" cstate="print">
+            <a:extLst>
+              <a:ext uri="{28A0092B-C50C-407E-A947-70E740481C1C}">
+                <a14:useLocalDpi xmlns:a14="http://schemas.microsoft.com/office/drawing/2010/main" val="0"/>
+              </a:ext>
+            </a:extLst>
+          </a:blip>
+          <a:srcRect/>
+          <a:stretch>
+            <a:fillRect/>
+          </a:stretch>
+        </p:blipFill>
+        <p:spPr bwMode="auto">
+          <a:xfrm>
+            <a:off x="4427984" y="1851670"/>
+            <a:ext cx="1619672" cy="980019"/>
+          </a:xfrm>
+          <a:prstGeom prst="rect">
+            <a:avLst/>
+          </a:prstGeom>
+          <a:noFill/>
+          <a:extLst>
+            <a:ext uri="{909E8E84-426E-40DD-AFC4-6F175D3DCCD1}">
+              <a14:hiddenFill xmlns:a14="http://schemas.microsoft.com/office/drawing/2010/main">
+                <a:solidFill>
+                  <a:srgbClr val="FFFFFF"/>
+                </a:solidFill>
+              </a14:hiddenFill>
+            </a:ext>
+          </a:extLst>
+        </p:spPr>
+      </p:pic>
+      <p:pic>
+        <p:nvPicPr>
+          <p:cNvPr id="1034" name="Picture 10"/>
+          <p:cNvPicPr>
+            <a:picLocks noChangeAspect="1" noChangeArrowheads="1"/>
+          </p:cNvPicPr>
+          <p:nvPr/>
+        </p:nvPicPr>
+        <p:blipFill>
+          <a:blip r:embed="rId12" cstate="print">
+            <a:extLst>
+              <a:ext uri="{28A0092B-C50C-407E-A947-70E740481C1C}">
+                <a14:useLocalDpi xmlns:a14="http://schemas.microsoft.com/office/drawing/2010/main" val="0"/>
+              </a:ext>
+            </a:extLst>
+          </a:blip>
+          <a:srcRect/>
+          <a:stretch>
+            <a:fillRect/>
+          </a:stretch>
+        </p:blipFill>
+        <p:spPr bwMode="auto">
+          <a:xfrm>
+            <a:off x="1043608" y="3147814"/>
+            <a:ext cx="1296144" cy="1164236"/>
+          </a:xfrm>
+          <a:prstGeom prst="rect">
+            <a:avLst/>
+          </a:prstGeom>
+          <a:noFill/>
+          <a:ln>
+            <a:noFill/>
+          </a:ln>
+          <a:effectLst/>
+          <a:extLst>
+            <a:ext uri="{909E8E84-426E-40DD-AFC4-6F175D3DCCD1}">
+              <a14:hiddenFill xmlns:a14="http://schemas.microsoft.com/office/drawing/2010/main">
+                <a:solidFill>
+                  <a:schemeClr val="accent1"/>
+                </a:solidFill>
+              </a14:hiddenFill>
+            </a:ext>
+            <a:ext uri="{91240B29-F687-4F45-9708-019B960494DF}">
+              <a14:hiddenLine xmlns:a14="http://schemas.microsoft.com/office/drawing/2010/main" w="9525">
+                <a:solidFill>
+                  <a:schemeClr val="tx1"/>
+                </a:solidFill>
+                <a:miter lim="800000"/>
+                <a:headEnd/>
+                <a:tailEnd/>
+              </a14:hiddenLine>
+            </a:ext>
+            <a:ext uri="{AF507438-7753-43E0-B8FC-AC1667EBCBE1}">
+              <a14:hiddenEffects xmlns:a14="http://schemas.microsoft.com/office/drawing/2010/main">
+                <a:effectLst>
+                  <a:outerShdw dist="35921" dir="2700000" algn="ctr" rotWithShape="0">
+                    <a:schemeClr val="bg2"/>
+                  </a:outerShdw>
+                </a:effectLst>
+              </a14:hiddenEffects>
+            </a:ext>
+          </a:extLst>
+        </p:spPr>
+      </p:pic>
+      <p:pic>
+        <p:nvPicPr>
+          <p:cNvPr id="1035" name="Picture 11"/>
+          <p:cNvPicPr>
+            <a:picLocks noChangeAspect="1" noChangeArrowheads="1"/>
+          </p:cNvPicPr>
+          <p:nvPr/>
+        </p:nvPicPr>
+        <p:blipFill>
+          <a:blip r:embed="rId13" cstate="print">
+            <a:clrChange>
+              <a:clrFrom>
+                <a:srgbClr val="000000"/>
+              </a:clrFrom>
+              <a:clrTo>
+                <a:srgbClr val="000000">
+                  <a:alpha val="0"/>
+                </a:srgbClr>
+              </a:clrTo>
+            </a:clrChange>
+            <a:extLst>
+              <a:ext uri="{28A0092B-C50C-407E-A947-70E740481C1C}">
+                <a14:useLocalDpi xmlns:a14="http://schemas.microsoft.com/office/drawing/2010/main" val="0"/>
+              </a:ext>
+            </a:extLst>
+          </a:blip>
+          <a:srcRect/>
+          <a:stretch>
+            <a:fillRect/>
+          </a:stretch>
+        </p:blipFill>
+        <p:spPr bwMode="auto">
+          <a:xfrm>
+            <a:off x="3727914" y="3041659"/>
+            <a:ext cx="1184617" cy="1736278"/>
+          </a:xfrm>
+          <a:prstGeom prst="rect">
+            <a:avLst/>
+          </a:prstGeom>
+          <a:noFill/>
+          <a:ln>
+            <a:noFill/>
+          </a:ln>
+          <a:effectLst/>
+          <a:extLst>
+            <a:ext uri="{909E8E84-426E-40DD-AFC4-6F175D3DCCD1}">
+              <a14:hiddenFill xmlns:a14="http://schemas.microsoft.com/office/drawing/2010/main">
+                <a:solidFill>
+                  <a:schemeClr val="accent1"/>
+                </a:solidFill>
+              </a14:hiddenFill>
+            </a:ext>
+            <a:ext uri="{91240B29-F687-4F45-9708-019B960494DF}">
+              <a14:hiddenLine xmlns:a14="http://schemas.microsoft.com/office/drawing/2010/main" w="9525">
+                <a:solidFill>
+                  <a:schemeClr val="tx1"/>
+                </a:solidFill>
+                <a:miter lim="800000"/>
+                <a:headEnd/>
+                <a:tailEnd/>
+              </a14:hiddenLine>
+            </a:ext>
+            <a:ext uri="{AF507438-7753-43E0-B8FC-AC1667EBCBE1}">
+              <a14:hiddenEffects xmlns:a14="http://schemas.microsoft.com/office/drawing/2010/main">
+                <a:effectLst>
+                  <a:outerShdw dist="35921" dir="2700000" algn="ctr" rotWithShape="0">
+                    <a:schemeClr val="bg2"/>
+                  </a:outerShdw>
+                </a:effectLst>
+              </a14:hiddenEffects>
+            </a:ext>
+          </a:extLst>
+        </p:spPr>
+      </p:pic>
+      <p:pic>
+        <p:nvPicPr>
+          <p:cNvPr id="1037" name="Picture 13"/>
+          <p:cNvPicPr>
+            <a:picLocks noChangeAspect="1" noChangeArrowheads="1"/>
+          </p:cNvPicPr>
+          <p:nvPr/>
+        </p:nvPicPr>
+        <p:blipFill>
+          <a:blip r:embed="rId14">
+            <a:extLst>
+              <a:ext uri="{28A0092B-C50C-407E-A947-70E740481C1C}">
+                <a14:useLocalDpi xmlns:a14="http://schemas.microsoft.com/office/drawing/2010/main" val="0"/>
+              </a:ext>
+            </a:extLst>
+          </a:blip>
+          <a:srcRect/>
+          <a:stretch>
+            <a:fillRect/>
+          </a:stretch>
+        </p:blipFill>
+        <p:spPr bwMode="auto">
+          <a:xfrm>
+            <a:off x="6654090" y="2964356"/>
+            <a:ext cx="1926067" cy="1302130"/>
+          </a:xfrm>
+          <a:prstGeom prst="rect">
+            <a:avLst/>
+          </a:prstGeom>
+          <a:noFill/>
+          <a:ln>
+            <a:noFill/>
+          </a:ln>
+          <a:effectLst/>
+          <a:extLst>
+            <a:ext uri="{909E8E84-426E-40DD-AFC4-6F175D3DCCD1}">
+              <a14:hiddenFill xmlns:a14="http://schemas.microsoft.com/office/drawing/2010/main">
+                <a:solidFill>
+                  <a:schemeClr val="accent1"/>
+                </a:solidFill>
+              </a14:hiddenFill>
+            </a:ext>
+            <a:ext uri="{91240B29-F687-4F45-9708-019B960494DF}">
+              <a14:hiddenLine xmlns:a14="http://schemas.microsoft.com/office/drawing/2010/main" w="9525">
+                <a:solidFill>
+                  <a:schemeClr val="tx1"/>
+                </a:solidFill>
+                <a:miter lim="800000"/>
+                <a:headEnd/>
+                <a:tailEnd/>
+              </a14:hiddenLine>
+            </a:ext>
+            <a:ext uri="{AF507438-7753-43E0-B8FC-AC1667EBCBE1}">
+              <a14:hiddenEffects xmlns:a14="http://schemas.microsoft.com/office/drawing/2010/main">
+                <a:effectLst>
+                  <a:outerShdw dist="35921" dir="2700000" algn="ctr" rotWithShape="0">
+                    <a:schemeClr val="bg2"/>
+                  </a:outerShdw>
+                </a:effectLst>
+              </a14:hiddenEffects>
+            </a:ext>
+          </a:extLst>
+        </p:spPr>
+      </p:pic>
+      <p:pic>
+        <p:nvPicPr>
+          <p:cNvPr id="1043" name="Picture 19"/>
+          <p:cNvPicPr>
+            <a:picLocks noChangeAspect="1" noChangeArrowheads="1"/>
+          </p:cNvPicPr>
+          <p:nvPr/>
+        </p:nvPicPr>
+        <p:blipFill>
+          <a:blip r:embed="rId15">
+            <a:extLst>
+              <a:ext uri="{28A0092B-C50C-407E-A947-70E740481C1C}">
+                <a14:useLocalDpi xmlns:a14="http://schemas.microsoft.com/office/drawing/2010/main" val="0"/>
+              </a:ext>
+            </a:extLst>
+          </a:blip>
+          <a:srcRect/>
+          <a:stretch>
+            <a:fillRect/>
+          </a:stretch>
+        </p:blipFill>
+        <p:spPr bwMode="auto">
+          <a:xfrm>
+            <a:off x="6631399" y="1565299"/>
+            <a:ext cx="2381378" cy="1252144"/>
+          </a:xfrm>
+          <a:prstGeom prst="rect">
+            <a:avLst/>
+          </a:prstGeom>
+          <a:noFill/>
+          <a:ln>
+            <a:noFill/>
+          </a:ln>
+          <a:effectLst/>
+          <a:extLst>
+            <a:ext uri="{909E8E84-426E-40DD-AFC4-6F175D3DCCD1}">
+              <a14:hiddenFill xmlns:a14="http://schemas.microsoft.com/office/drawing/2010/main">
+                <a:solidFill>
+                  <a:schemeClr val="accent1"/>
+                </a:solidFill>
+              </a14:hiddenFill>
+            </a:ext>
+            <a:ext uri="{91240B29-F687-4F45-9708-019B960494DF}">
+              <a14:hiddenLine xmlns:a14="http://schemas.microsoft.com/office/drawing/2010/main" w="9525">
+                <a:solidFill>
+                  <a:schemeClr val="tx1"/>
+                </a:solidFill>
+                <a:miter lim="800000"/>
+                <a:headEnd/>
+                <a:tailEnd/>
+              </a14:hiddenLine>
+            </a:ext>
+            <a:ext uri="{AF507438-7753-43E0-B8FC-AC1667EBCBE1}">
+              <a14:hiddenEffects xmlns:a14="http://schemas.microsoft.com/office/drawing/2010/main">
+                <a:effectLst>
+                  <a:outerShdw dist="35921" dir="2700000" algn="ctr" rotWithShape="0">
+                    <a:schemeClr val="bg2"/>
+                  </a:outerShdw>
+                </a:effectLst>
+              </a14:hiddenEffects>
+            </a:ext>
+          </a:extLst>
+        </p:spPr>
+      </p:pic>
+      <p:sp>
+        <p:nvSpPr>
+          <p:cNvPr id="15" name="Rectangle 14"/>
+          <p:cNvSpPr/>
+          <p:nvPr/>
+        </p:nvSpPr>
+        <p:spPr>
+          <a:xfrm>
+            <a:off x="4636405" y="267494"/>
+            <a:ext cx="1202830" cy="523220"/>
+          </a:xfrm>
+          <a:prstGeom prst="rect">
+            <a:avLst/>
+          </a:prstGeom>
+          <a:noFill/>
+        </p:spPr>
+        <p:txBody>
+          <a:bodyPr wrap="none" lIns="91440" tIns="45720" rIns="91440" bIns="45720">
+            <a:spAutoFit/>
+          </a:bodyPr>
+          <a:lstStyle/>
+          <a:p>
+            <a:pPr algn="ctr"/>
+            <a:r>
+              <a:rPr lang="id-ID" sz="2800" b="0" cap="none" spc="0" dirty="0" smtClean="0">
+                <a:ln w="18415" cmpd="sng">
+                  <a:solidFill>
+                    <a:srgbClr val="FFFFFF"/>
+                  </a:solidFill>
+                  <a:prstDash val="solid"/>
+                </a:ln>
+                <a:solidFill>
+                  <a:srgbClr val="FFFFFF"/>
+                </a:solidFill>
+                <a:effectLst>
+                  <a:outerShdw blurRad="63500" dir="3600000" algn="tl" rotWithShape="0">
+                    <a:srgbClr val="000000">
+                      <a:alpha val="70000"/>
+                    </a:srgbClr>
+                  </a:outerShdw>
+                </a:effectLst>
+              </a:rPr>
+              <a:t>Traffic</a:t>
+            </a:r>
+            <a:endParaRPr lang="en-US" sz="2800" b="0" cap="none" spc="0" dirty="0">
+              <a:ln w="18415" cmpd="sng">
+                <a:solidFill>
+                  <a:srgbClr val="FFFFFF"/>
+                </a:solidFill>
+                <a:prstDash val="solid"/>
+              </a:ln>
+              <a:solidFill>
+                <a:srgbClr val="FFFFFF"/>
+              </a:solidFill>
+              <a:effectLst>
+                <a:outerShdw blurRad="63500" dir="3600000" algn="tl" rotWithShape="0">
+                  <a:srgbClr val="000000">
+                    <a:alpha val="70000"/>
+                  </a:srgbClr>
+                </a:outerShdw>
+              </a:effectLst>
+            </a:endParaRPr>
+          </a:p>
+        </p:txBody>
+      </p:sp>
+      <p:sp>
+        <p:nvSpPr>
+          <p:cNvPr id="32" name="Rectangle 31"/>
+          <p:cNvSpPr/>
+          <p:nvPr/>
+        </p:nvSpPr>
+        <p:spPr>
+          <a:xfrm>
+            <a:off x="4616585" y="987574"/>
+            <a:ext cx="1035861" cy="523220"/>
+          </a:xfrm>
+          <a:prstGeom prst="rect">
+            <a:avLst/>
+          </a:prstGeom>
+          <a:noFill/>
+        </p:spPr>
+        <p:txBody>
+          <a:bodyPr wrap="none" lIns="91440" tIns="45720" rIns="91440" bIns="45720">
+            <a:spAutoFit/>
+          </a:bodyPr>
+          <a:lstStyle/>
+          <a:p>
+            <a:pPr algn="ctr"/>
+            <a:r>
+              <a:rPr lang="id-ID" sz="2800" b="0" cap="none" spc="0" dirty="0" smtClean="0">
+                <a:ln w="18415" cmpd="sng">
+                  <a:solidFill>
+                    <a:srgbClr val="FFFFFF"/>
+                  </a:solidFill>
+                  <a:prstDash val="solid"/>
+                </a:ln>
+                <a:solidFill>
+                  <a:srgbClr val="FFFFFF"/>
+                </a:solidFill>
+                <a:effectLst>
+                  <a:outerShdw blurRad="63500" dir="3600000" algn="tl" rotWithShape="0">
+                    <a:srgbClr val="000000">
+                      <a:alpha val="70000"/>
+                    </a:srgbClr>
+                  </a:outerShdw>
+                </a:effectLst>
+              </a:rPr>
+              <a:t>Snort</a:t>
+            </a:r>
+            <a:endParaRPr lang="en-US" sz="2800" b="0" cap="none" spc="0" dirty="0">
+              <a:ln w="18415" cmpd="sng">
+                <a:solidFill>
+                  <a:srgbClr val="FFFFFF"/>
+                </a:solidFill>
+                <a:prstDash val="solid"/>
+              </a:ln>
+              <a:solidFill>
+                <a:srgbClr val="FFFFFF"/>
+              </a:solidFill>
+              <a:effectLst>
+                <a:outerShdw blurRad="63500" dir="3600000" algn="tl" rotWithShape="0">
+                  <a:srgbClr val="000000">
+                    <a:alpha val="70000"/>
+                  </a:srgbClr>
+                </a:outerShdw>
+              </a:effectLst>
+            </a:endParaRPr>
+          </a:p>
+        </p:txBody>
+      </p:sp>
+      <p:sp>
+        <p:nvSpPr>
+          <p:cNvPr id="33" name="Rectangle 32"/>
+          <p:cNvSpPr/>
+          <p:nvPr/>
+        </p:nvSpPr>
+        <p:spPr>
+          <a:xfrm>
+            <a:off x="4886804" y="2702746"/>
+            <a:ext cx="800220" cy="523220"/>
+          </a:xfrm>
+          <a:prstGeom prst="rect">
+            <a:avLst/>
+          </a:prstGeom>
+          <a:noFill/>
+        </p:spPr>
+        <p:txBody>
+          <a:bodyPr wrap="none" lIns="91440" tIns="45720" rIns="91440" bIns="45720">
+            <a:spAutoFit/>
+          </a:bodyPr>
+          <a:lstStyle/>
+          <a:p>
+            <a:pPr algn="ctr"/>
+            <a:r>
+              <a:rPr lang="id-ID" sz="2800" b="0" cap="none" spc="0" dirty="0" smtClean="0">
+                <a:ln w="18415" cmpd="sng">
+                  <a:solidFill>
+                    <a:srgbClr val="FFFFFF"/>
+                  </a:solidFill>
+                  <a:prstDash val="solid"/>
+                </a:ln>
+                <a:solidFill>
+                  <a:srgbClr val="FFFFFF"/>
+                </a:solidFill>
+                <a:effectLst>
+                  <a:outerShdw blurRad="63500" dir="3600000" algn="tl" rotWithShape="0">
+                    <a:srgbClr val="000000">
+                      <a:alpha val="70000"/>
+                    </a:srgbClr>
+                  </a:outerShdw>
+                </a:effectLst>
+              </a:rPr>
+              <a:t>Log</a:t>
+            </a:r>
+            <a:endParaRPr lang="en-US" sz="2800" b="0" cap="none" spc="0" dirty="0">
+              <a:ln w="18415" cmpd="sng">
+                <a:solidFill>
+                  <a:srgbClr val="FFFFFF"/>
+                </a:solidFill>
+                <a:prstDash val="solid"/>
+              </a:ln>
+              <a:solidFill>
+                <a:srgbClr val="FFFFFF"/>
+              </a:solidFill>
+              <a:effectLst>
+                <a:outerShdw blurRad="63500" dir="3600000" algn="tl" rotWithShape="0">
+                  <a:srgbClr val="000000">
+                    <a:alpha val="70000"/>
+                  </a:srgbClr>
+                </a:outerShdw>
+              </a:effectLst>
+            </a:endParaRPr>
+          </a:p>
+        </p:txBody>
+      </p:sp>
+      <p:sp>
+        <p:nvSpPr>
+          <p:cNvPr id="34" name="Rectangle 33"/>
+          <p:cNvSpPr/>
+          <p:nvPr/>
+        </p:nvSpPr>
+        <p:spPr>
+          <a:xfrm>
+            <a:off x="6250406" y="4155926"/>
+            <a:ext cx="2733441" cy="523220"/>
+          </a:xfrm>
+          <a:prstGeom prst="rect">
+            <a:avLst/>
+          </a:prstGeom>
+          <a:noFill/>
+        </p:spPr>
+        <p:txBody>
+          <a:bodyPr wrap="none" lIns="91440" tIns="45720" rIns="91440" bIns="45720">
+            <a:spAutoFit/>
+          </a:bodyPr>
+          <a:lstStyle/>
+          <a:p>
+            <a:pPr algn="ctr"/>
+            <a:r>
+              <a:rPr lang="id-ID" sz="2800" b="0" cap="none" spc="0" dirty="0" smtClean="0">
+                <a:ln w="18415" cmpd="sng">
+                  <a:solidFill>
+                    <a:srgbClr val="FFFFFF"/>
+                  </a:solidFill>
+                  <a:prstDash val="solid"/>
+                </a:ln>
+                <a:solidFill>
+                  <a:srgbClr val="FFFFFF"/>
+                </a:solidFill>
+                <a:effectLst>
+                  <a:outerShdw blurRad="63500" dir="3600000" algn="tl" rotWithShape="0">
+                    <a:srgbClr val="000000">
+                      <a:alpha val="70000"/>
+                    </a:srgbClr>
+                  </a:outerShdw>
+                </a:effectLst>
+              </a:rPr>
+              <a:t>Stream (Instant)</a:t>
+            </a:r>
+            <a:endParaRPr lang="en-US" sz="2800" b="0" cap="none" spc="0" dirty="0">
+              <a:ln w="18415" cmpd="sng">
+                <a:solidFill>
+                  <a:srgbClr val="FFFFFF"/>
+                </a:solidFill>
+                <a:prstDash val="solid"/>
+              </a:ln>
+              <a:solidFill>
+                <a:srgbClr val="FFFFFF"/>
+              </a:solidFill>
+              <a:effectLst>
+                <a:outerShdw blurRad="63500" dir="3600000" algn="tl" rotWithShape="0">
+                  <a:srgbClr val="000000">
+                    <a:alpha val="70000"/>
+                  </a:srgbClr>
+                </a:outerShdw>
+              </a:effectLst>
+            </a:endParaRPr>
+          </a:p>
+        </p:txBody>
+      </p:sp>
+      <p:sp>
+        <p:nvSpPr>
+          <p:cNvPr id="35" name="Rectangle 34"/>
+          <p:cNvSpPr/>
+          <p:nvPr/>
+        </p:nvSpPr>
+        <p:spPr>
+          <a:xfrm>
+            <a:off x="4636405" y="3465644"/>
+            <a:ext cx="1503937" cy="954107"/>
+          </a:xfrm>
+          <a:prstGeom prst="rect">
+            <a:avLst/>
+          </a:prstGeom>
+          <a:noFill/>
+        </p:spPr>
+        <p:txBody>
+          <a:bodyPr wrap="none" lIns="91440" tIns="45720" rIns="91440" bIns="45720">
+            <a:spAutoFit/>
+          </a:bodyPr>
+          <a:lstStyle/>
+          <a:p>
+            <a:pPr algn="ctr"/>
+            <a:r>
+              <a:rPr lang="id-ID" sz="2800" b="0" cap="none" spc="0" dirty="0" smtClean="0">
+                <a:ln w="18415" cmpd="sng">
+                  <a:solidFill>
+                    <a:srgbClr val="FFFFFF"/>
+                  </a:solidFill>
+                  <a:prstDash val="solid"/>
+                </a:ln>
+                <a:solidFill>
+                  <a:srgbClr val="FFFFFF"/>
+                </a:solidFill>
+                <a:effectLst>
+                  <a:outerShdw blurRad="63500" dir="3600000" algn="tl" rotWithShape="0">
+                    <a:srgbClr val="000000">
+                      <a:alpha val="70000"/>
+                    </a:srgbClr>
+                  </a:outerShdw>
+                </a:effectLst>
+              </a:rPr>
+              <a:t>Batch </a:t>
+            </a:r>
+          </a:p>
+          <a:p>
+            <a:pPr algn="ctr"/>
+            <a:r>
+              <a:rPr lang="id-ID" sz="2800" b="0" cap="none" spc="0" dirty="0" smtClean="0">
+                <a:ln w="18415" cmpd="sng">
+                  <a:solidFill>
+                    <a:srgbClr val="FFFFFF"/>
+                  </a:solidFill>
+                  <a:prstDash val="solid"/>
+                </a:ln>
+                <a:solidFill>
+                  <a:srgbClr val="FFFFFF"/>
+                </a:solidFill>
+                <a:effectLst>
+                  <a:outerShdw blurRad="63500" dir="3600000" algn="tl" rotWithShape="0">
+                    <a:srgbClr val="000000">
+                      <a:alpha val="70000"/>
+                    </a:srgbClr>
+                  </a:outerShdw>
+                </a:effectLst>
+              </a:rPr>
+              <a:t>(15min) </a:t>
+            </a:r>
+            <a:endParaRPr lang="en-US" sz="2800" b="0" cap="none" spc="0" dirty="0">
+              <a:ln w="18415" cmpd="sng">
+                <a:solidFill>
+                  <a:srgbClr val="FFFFFF"/>
+                </a:solidFill>
+                <a:prstDash val="solid"/>
+              </a:ln>
+              <a:solidFill>
+                <a:srgbClr val="FFFFFF"/>
+              </a:solidFill>
+              <a:effectLst>
+                <a:outerShdw blurRad="63500" dir="3600000" algn="tl" rotWithShape="0">
+                  <a:srgbClr val="000000">
+                    <a:alpha val="70000"/>
+                  </a:srgbClr>
+                </a:outerShdw>
+              </a:effectLst>
+            </a:endParaRPr>
+          </a:p>
+        </p:txBody>
+      </p:sp>
+      <p:sp>
+        <p:nvSpPr>
+          <p:cNvPr id="36" name="Rectangle 35"/>
+          <p:cNvSpPr/>
+          <p:nvPr/>
+        </p:nvSpPr>
+        <p:spPr>
+          <a:xfrm>
+            <a:off x="324541" y="2710532"/>
+            <a:ext cx="2694969" cy="523220"/>
+          </a:xfrm>
+          <a:prstGeom prst="rect">
+            <a:avLst/>
+          </a:prstGeom>
+          <a:noFill/>
+        </p:spPr>
+        <p:txBody>
+          <a:bodyPr wrap="none" lIns="91440" tIns="45720" rIns="91440" bIns="45720">
+            <a:spAutoFit/>
+          </a:bodyPr>
+          <a:lstStyle/>
+          <a:p>
+            <a:pPr algn="ctr"/>
+            <a:r>
+              <a:rPr lang="id-ID" sz="2800" b="0" cap="none" spc="0" dirty="0" smtClean="0">
+                <a:ln w="18415" cmpd="sng">
+                  <a:solidFill>
+                    <a:srgbClr val="FFFFFF"/>
+                  </a:solidFill>
+                  <a:prstDash val="solid"/>
+                </a:ln>
+                <a:solidFill>
+                  <a:srgbClr val="FFFFFF"/>
+                </a:solidFill>
+                <a:effectLst>
+                  <a:outerShdw blurRad="63500" dir="3600000" algn="tl" rotWithShape="0">
+                    <a:srgbClr val="000000">
+                      <a:alpha val="70000"/>
+                    </a:srgbClr>
+                  </a:outerShdw>
+                </a:effectLst>
+              </a:rPr>
+              <a:t>Batch (depend) </a:t>
+            </a:r>
+            <a:endParaRPr lang="en-US" sz="2800" b="0" cap="none" spc="0" dirty="0">
+              <a:ln w="18415" cmpd="sng">
+                <a:solidFill>
+                  <a:srgbClr val="FFFFFF"/>
+                </a:solidFill>
+                <a:prstDash val="solid"/>
+              </a:ln>
+              <a:solidFill>
+                <a:srgbClr val="FFFFFF"/>
+              </a:solidFill>
+              <a:effectLst>
+                <a:outerShdw blurRad="63500" dir="3600000" algn="tl" rotWithShape="0">
+                  <a:srgbClr val="000000">
+                    <a:alpha val="70000"/>
+                  </a:srgbClr>
+                </a:outerShdw>
+              </a:effectLst>
+            </a:endParaRPr>
+          </a:p>
+        </p:txBody>
+      </p:sp>
+      <p:sp>
+        <p:nvSpPr>
+          <p:cNvPr id="37" name="Rectangle 36"/>
+          <p:cNvSpPr/>
+          <p:nvPr/>
+        </p:nvSpPr>
+        <p:spPr>
+          <a:xfrm>
+            <a:off x="7321032" y="1579545"/>
+            <a:ext cx="1691745" cy="954107"/>
+          </a:xfrm>
+          <a:prstGeom prst="rect">
+            <a:avLst/>
+          </a:prstGeom>
+          <a:noFill/>
+        </p:spPr>
+        <p:txBody>
+          <a:bodyPr wrap="none" lIns="91440" tIns="45720" rIns="91440" bIns="45720">
+            <a:spAutoFit/>
+          </a:bodyPr>
+          <a:lstStyle/>
+          <a:p>
+            <a:pPr algn="ctr"/>
+            <a:r>
+              <a:rPr lang="id-ID" sz="2800" b="0" cap="none" spc="0" dirty="0" smtClean="0">
+                <a:ln w="18415" cmpd="sng">
+                  <a:solidFill>
+                    <a:srgbClr val="FFFFFF"/>
+                  </a:solidFill>
+                  <a:prstDash val="solid"/>
+                </a:ln>
+                <a:solidFill>
+                  <a:srgbClr val="FFFFFF"/>
+                </a:solidFill>
+                <a:effectLst>
+                  <a:outerShdw blurRad="63500" dir="3600000" algn="tl" rotWithShape="0">
+                    <a:srgbClr val="000000">
+                      <a:alpha val="70000"/>
+                    </a:srgbClr>
+                  </a:outerShdw>
+                </a:effectLst>
+              </a:rPr>
+              <a:t>Network </a:t>
+            </a:r>
+          </a:p>
+          <a:p>
+            <a:pPr algn="ctr"/>
+            <a:r>
+              <a:rPr lang="id-ID" sz="2800" b="0" cap="none" spc="0" dirty="0" smtClean="0">
+                <a:ln w="18415" cmpd="sng">
+                  <a:solidFill>
+                    <a:srgbClr val="FFFFFF"/>
+                  </a:solidFill>
+                  <a:prstDash val="solid"/>
+                </a:ln>
+                <a:solidFill>
+                  <a:srgbClr val="FFFFFF"/>
+                </a:solidFill>
+                <a:effectLst>
+                  <a:outerShdw blurRad="63500" dir="3600000" algn="tl" rotWithShape="0">
+                    <a:srgbClr val="000000">
+                      <a:alpha val="70000"/>
+                    </a:srgbClr>
+                  </a:outerShdw>
+                </a:effectLst>
+              </a:rPr>
+              <a:t>Admin</a:t>
+            </a:r>
+            <a:endParaRPr lang="en-US" sz="2800" b="0" cap="none" spc="0" dirty="0">
+              <a:ln w="18415" cmpd="sng">
+                <a:solidFill>
+                  <a:srgbClr val="FFFFFF"/>
+                </a:solidFill>
+                <a:prstDash val="solid"/>
+              </a:ln>
+              <a:solidFill>
+                <a:srgbClr val="FFFFFF"/>
+              </a:solidFill>
+              <a:effectLst>
+                <a:outerShdw blurRad="63500" dir="3600000" algn="tl" rotWithShape="0">
+                  <a:srgbClr val="000000">
+                    <a:alpha val="70000"/>
+                  </a:srgbClr>
+                </a:outerShdw>
+              </a:effectLst>
+            </a:endParaRPr>
+          </a:p>
+        </p:txBody>
+      </p:sp>
+      <p:pic>
+        <p:nvPicPr>
+          <p:cNvPr id="1044" name="Picture 20"/>
+          <p:cNvPicPr>
+            <a:picLocks noChangeAspect="1" noChangeArrowheads="1"/>
+          </p:cNvPicPr>
+          <p:nvPr/>
+        </p:nvPicPr>
+        <p:blipFill>
+          <a:blip r:embed="rId16" cstate="print">
+            <a:extLst>
+              <a:ext uri="{28A0092B-C50C-407E-A947-70E740481C1C}">
+                <a14:useLocalDpi xmlns:a14="http://schemas.microsoft.com/office/drawing/2010/main" val="0"/>
+              </a:ext>
+            </a:extLst>
+          </a:blip>
+          <a:srcRect/>
+          <a:stretch>
+            <a:fillRect/>
+          </a:stretch>
+        </p:blipFill>
+        <p:spPr bwMode="auto">
+          <a:xfrm>
+            <a:off x="614894" y="1717973"/>
+            <a:ext cx="1677180" cy="946795"/>
+          </a:xfrm>
+          <a:prstGeom prst="rect">
+            <a:avLst/>
+          </a:prstGeom>
+          <a:noFill/>
+          <a:ln>
+            <a:noFill/>
+          </a:ln>
+          <a:effectLst/>
+          <a:extLst>
+            <a:ext uri="{909E8E84-426E-40DD-AFC4-6F175D3DCCD1}">
+              <a14:hiddenFill xmlns:a14="http://schemas.microsoft.com/office/drawing/2010/main">
+                <a:solidFill>
+                  <a:schemeClr val="accent1"/>
+                </a:solidFill>
+              </a14:hiddenFill>
+            </a:ext>
+            <a:ext uri="{91240B29-F687-4F45-9708-019B960494DF}">
+              <a14:hiddenLine xmlns:a14="http://schemas.microsoft.com/office/drawing/2010/main" w="9525">
+                <a:solidFill>
+                  <a:schemeClr val="tx1"/>
+                </a:solidFill>
+                <a:miter lim="800000"/>
+                <a:headEnd/>
+                <a:tailEnd/>
+              </a14:hiddenLine>
+            </a:ext>
+            <a:ext uri="{AF507438-7753-43E0-B8FC-AC1667EBCBE1}">
+              <a14:hiddenEffects xmlns:a14="http://schemas.microsoft.com/office/drawing/2010/main">
+                <a:effectLst>
+                  <a:outerShdw dist="35921" dir="2700000" algn="ctr" rotWithShape="0">
+                    <a:schemeClr val="bg2"/>
+                  </a:outerShdw>
+                </a:effectLst>
+              </a14:hiddenEffects>
+            </a:ext>
+          </a:extLst>
+        </p:spPr>
+      </p:pic>
+      <p:sp>
+        <p:nvSpPr>
+          <p:cNvPr id="39" name="Rectangle 38"/>
+          <p:cNvSpPr/>
+          <p:nvPr/>
+        </p:nvSpPr>
+        <p:spPr>
+          <a:xfrm>
+            <a:off x="867084" y="1456363"/>
+            <a:ext cx="1247457" cy="523220"/>
+          </a:xfrm>
+          <a:prstGeom prst="rect">
+            <a:avLst/>
+          </a:prstGeom>
+          <a:noFill/>
+        </p:spPr>
+        <p:txBody>
+          <a:bodyPr wrap="none" lIns="91440" tIns="45720" rIns="91440" bIns="45720">
+            <a:spAutoFit/>
+          </a:bodyPr>
+          <a:lstStyle/>
+          <a:p>
+            <a:pPr algn="ctr"/>
+            <a:r>
+              <a:rPr lang="id-ID" sz="2800" b="0" cap="none" spc="0" dirty="0" smtClean="0">
+                <a:ln w="18415" cmpd="sng">
+                  <a:solidFill>
+                    <a:srgbClr val="FFFFFF"/>
+                  </a:solidFill>
+                  <a:prstDash val="solid"/>
+                </a:ln>
+                <a:solidFill>
+                  <a:srgbClr val="FFFFFF"/>
+                </a:solidFill>
+                <a:effectLst>
+                  <a:outerShdw blurRad="63500" dir="3600000" algn="tl" rotWithShape="0">
+                    <a:srgbClr val="000000">
+                      <a:alpha val="70000"/>
+                    </a:srgbClr>
+                  </a:outerShdw>
+                </a:effectLst>
+              </a:rPr>
+              <a:t>Action</a:t>
+            </a:r>
+            <a:endParaRPr lang="en-US" sz="2800" b="0" cap="none" spc="0" dirty="0">
+              <a:ln w="18415" cmpd="sng">
+                <a:solidFill>
+                  <a:srgbClr val="FFFFFF"/>
+                </a:solidFill>
+                <a:prstDash val="solid"/>
+              </a:ln>
+              <a:solidFill>
+                <a:srgbClr val="FFFFFF"/>
+              </a:solidFill>
+              <a:effectLst>
+                <a:outerShdw blurRad="63500" dir="3600000" algn="tl" rotWithShape="0">
+                  <a:srgbClr val="000000">
+                    <a:alpha val="70000"/>
+                  </a:srgbClr>
+                </a:outerShdw>
+              </a:effectLst>
+            </a:endParaRPr>
+          </a:p>
+        </p:txBody>
+      </p:sp>
+    </p:spTree>
+    <p:extLst>
+      <p:ext uri="{BB962C8B-B14F-4D97-AF65-F5344CB8AC3E}">
+        <p14:creationId xmlns:p14="http://schemas.microsoft.com/office/powerpoint/2010/main" val="1978397482"/>
+      </p:ext>
+    </p:extLst>
+  </p:cSld>
+  <p:clrMapOvr>
+    <a:masterClrMapping/>
+  </p:clrMapOvr>
+  <p:timing>
+    <p:tnLst>
+      <p:par>
+        <p:cTn id="1" dur="indefinite" restart="never" nodeType="tmRoot">
+          <p:childTnLst>
+            <p:seq concurrent="1" nextAc="seek">
+              <p:cTn id="2" dur="indefinite" nodeType="mainSeq">
+                <p:childTnLst>
+                  <p:par>
+                    <p:cTn id="3" fill="hold">
+                      <p:stCondLst>
+                        <p:cond delay="indefinite"/>
+                      </p:stCondLst>
+                      <p:childTnLst>
+                        <p:par>
+                          <p:cTn id="4" fill="hold">
+                            <p:stCondLst>
+                              <p:cond delay="0"/>
+                            </p:stCondLst>
+                            <p:childTnLst>
+                              <p:par>
+                                <p:cTn id="5" presetID="10" presetClass="exit" presetSubtype="0" fill="hold" grpId="0" nodeType="clickEffect">
+                                  <p:stCondLst>
+                                    <p:cond delay="0"/>
+                                  </p:stCondLst>
+                                  <p:childTnLst>
+                                    <p:animEffect transition="out" filter="fade">
+                                      <p:cBhvr>
+                                        <p:cTn id="6" dur="500"/>
+                                        <p:tgtEl>
+                                          <p:spTgt spid="3"/>
+                                        </p:tgtEl>
+                                      </p:cBhvr>
+                                    </p:animEffect>
+                                    <p:set>
+                                      <p:cBhvr>
+                                        <p:cTn id="7" dur="1" fill="hold">
+                                          <p:stCondLst>
+                                            <p:cond delay="499"/>
+                                          </p:stCondLst>
+                                        </p:cTn>
+                                        <p:tgtEl>
+                                          <p:spTgt spid="3"/>
+                                        </p:tgtEl>
+                                        <p:attrNameLst>
+                                          <p:attrName>style.visibility</p:attrName>
+                                        </p:attrNameLst>
+                                      </p:cBhvr>
+                                      <p:to>
+                                        <p:strVal val="hidden"/>
+                                      </p:to>
+                                    </p:set>
+                                  </p:childTnLst>
+                                </p:cTn>
+                              </p:par>
+                              <p:par>
+                                <p:cTn id="8" presetID="10" presetClass="exit" presetSubtype="0" fill="hold" grpId="0" nodeType="withEffect">
+                                  <p:stCondLst>
+                                    <p:cond delay="0"/>
+                                  </p:stCondLst>
+                                  <p:childTnLst>
+                                    <p:animEffect transition="out" filter="fade">
+                                      <p:cBhvr>
+                                        <p:cTn id="9" dur="500"/>
+                                        <p:tgtEl>
+                                          <p:spTgt spid="5"/>
+                                        </p:tgtEl>
+                                      </p:cBhvr>
+                                    </p:animEffect>
+                                    <p:set>
+                                      <p:cBhvr>
+                                        <p:cTn id="10" dur="1" fill="hold">
+                                          <p:stCondLst>
+                                            <p:cond delay="499"/>
+                                          </p:stCondLst>
+                                        </p:cTn>
+                                        <p:tgtEl>
+                                          <p:spTgt spid="5"/>
+                                        </p:tgtEl>
+                                        <p:attrNameLst>
+                                          <p:attrName>style.visibility</p:attrName>
+                                        </p:attrNameLst>
+                                      </p:cBhvr>
+                                      <p:to>
+                                        <p:strVal val="hidden"/>
+                                      </p:to>
+                                    </p:set>
+                                  </p:childTnLst>
+                                </p:cTn>
+                              </p:par>
+                              <p:par>
+                                <p:cTn id="11" presetID="10" presetClass="exit" presetSubtype="0" fill="hold" grpId="0" nodeType="withEffect">
+                                  <p:stCondLst>
+                                    <p:cond delay="0"/>
+                                  </p:stCondLst>
+                                  <p:childTnLst>
+                                    <p:animEffect transition="out" filter="fade">
+                                      <p:cBhvr>
+                                        <p:cTn id="12" dur="500"/>
+                                        <p:tgtEl>
+                                          <p:spTgt spid="4"/>
+                                        </p:tgtEl>
+                                      </p:cBhvr>
+                                    </p:animEffect>
+                                    <p:set>
+                                      <p:cBhvr>
+                                        <p:cTn id="13" dur="1" fill="hold">
+                                          <p:stCondLst>
+                                            <p:cond delay="499"/>
+                                          </p:stCondLst>
+                                        </p:cTn>
+                                        <p:tgtEl>
+                                          <p:spTgt spid="4"/>
+                                        </p:tgtEl>
+                                        <p:attrNameLst>
+                                          <p:attrName>style.visibility</p:attrName>
+                                        </p:attrNameLst>
+                                      </p:cBhvr>
+                                      <p:to>
+                                        <p:strVal val="hidden"/>
+                                      </p:to>
+                                    </p:set>
+                                  </p:childTnLst>
+                                </p:cTn>
+                              </p:par>
+                            </p:childTnLst>
+                          </p:cTn>
+                        </p:par>
+                      </p:childTnLst>
+                    </p:cTn>
+                  </p:par>
+                  <p:par>
+                    <p:cTn id="14" fill="hold">
+                      <p:stCondLst>
+                        <p:cond delay="indefinite"/>
+                      </p:stCondLst>
+                      <p:childTnLst>
+                        <p:par>
+                          <p:cTn id="15" fill="hold">
+                            <p:stCondLst>
+                              <p:cond delay="0"/>
+                            </p:stCondLst>
+                            <p:childTnLst>
+                              <p:par>
+                                <p:cTn id="16" presetID="10" presetClass="entr" presetSubtype="0" fill="hold" nodeType="clickEffect">
+                                  <p:stCondLst>
+                                    <p:cond delay="0"/>
+                                  </p:stCondLst>
+                                  <p:childTnLst>
+                                    <p:set>
+                                      <p:cBhvr>
+                                        <p:cTn id="17" dur="1" fill="hold">
+                                          <p:stCondLst>
+                                            <p:cond delay="0"/>
+                                          </p:stCondLst>
+                                        </p:cTn>
+                                        <p:tgtEl>
+                                          <p:spTgt spid="1040"/>
+                                        </p:tgtEl>
+                                        <p:attrNameLst>
+                                          <p:attrName>style.visibility</p:attrName>
+                                        </p:attrNameLst>
+                                      </p:cBhvr>
+                                      <p:to>
+                                        <p:strVal val="visible"/>
+                                      </p:to>
+                                    </p:set>
+                                    <p:animEffect transition="in" filter="fade">
+                                      <p:cBhvr>
+                                        <p:cTn id="18" dur="500"/>
+                                        <p:tgtEl>
+                                          <p:spTgt spid="1040"/>
+                                        </p:tgtEl>
+                                      </p:cBhvr>
+                                    </p:animEffect>
+                                  </p:childTnLst>
+                                </p:cTn>
+                              </p:par>
+                              <p:par>
+                                <p:cTn id="19" presetID="10" presetClass="entr" presetSubtype="0" fill="hold" nodeType="withEffect">
+                                  <p:stCondLst>
+                                    <p:cond delay="0"/>
+                                  </p:stCondLst>
+                                  <p:childTnLst>
+                                    <p:set>
+                                      <p:cBhvr>
+                                        <p:cTn id="20" dur="1" fill="hold">
+                                          <p:stCondLst>
+                                            <p:cond delay="0"/>
+                                          </p:stCondLst>
+                                        </p:cTn>
+                                        <p:tgtEl>
+                                          <p:spTgt spid="1041"/>
+                                        </p:tgtEl>
+                                        <p:attrNameLst>
+                                          <p:attrName>style.visibility</p:attrName>
+                                        </p:attrNameLst>
+                                      </p:cBhvr>
+                                      <p:to>
+                                        <p:strVal val="visible"/>
+                                      </p:to>
+                                    </p:set>
+                                    <p:animEffect transition="in" filter="fade">
+                                      <p:cBhvr>
+                                        <p:cTn id="21" dur="500"/>
+                                        <p:tgtEl>
+                                          <p:spTgt spid="1041"/>
+                                        </p:tgtEl>
+                                      </p:cBhvr>
+                                    </p:animEffect>
+                                  </p:childTnLst>
+                                </p:cTn>
+                              </p:par>
+                              <p:par>
+                                <p:cTn id="22" presetID="10" presetClass="entr" presetSubtype="0" fill="hold" nodeType="withEffect">
+                                  <p:stCondLst>
+                                    <p:cond delay="0"/>
+                                  </p:stCondLst>
+                                  <p:childTnLst>
+                                    <p:set>
+                                      <p:cBhvr>
+                                        <p:cTn id="23" dur="1" fill="hold">
+                                          <p:stCondLst>
+                                            <p:cond delay="0"/>
+                                          </p:stCondLst>
+                                        </p:cTn>
+                                        <p:tgtEl>
+                                          <p:spTgt spid="9"/>
+                                        </p:tgtEl>
+                                        <p:attrNameLst>
+                                          <p:attrName>style.visibility</p:attrName>
+                                        </p:attrNameLst>
+                                      </p:cBhvr>
+                                      <p:to>
+                                        <p:strVal val="visible"/>
+                                      </p:to>
+                                    </p:set>
+                                    <p:animEffect transition="in" filter="fade">
+                                      <p:cBhvr>
+                                        <p:cTn id="24" dur="500"/>
+                                        <p:tgtEl>
+                                          <p:spTgt spid="9"/>
+                                        </p:tgtEl>
+                                      </p:cBhvr>
+                                    </p:animEffect>
+                                  </p:childTnLst>
+                                </p:cTn>
+                              </p:par>
+                              <p:par>
+                                <p:cTn id="25" presetID="10" presetClass="entr" presetSubtype="0" fill="hold" nodeType="withEffect">
+                                  <p:stCondLst>
+                                    <p:cond delay="0"/>
+                                  </p:stCondLst>
+                                  <p:childTnLst>
+                                    <p:set>
+                                      <p:cBhvr>
+                                        <p:cTn id="26" dur="1" fill="hold">
+                                          <p:stCondLst>
+                                            <p:cond delay="0"/>
+                                          </p:stCondLst>
+                                        </p:cTn>
+                                        <p:tgtEl>
+                                          <p:spTgt spid="1029"/>
+                                        </p:tgtEl>
+                                        <p:attrNameLst>
+                                          <p:attrName>style.visibility</p:attrName>
+                                        </p:attrNameLst>
+                                      </p:cBhvr>
+                                      <p:to>
+                                        <p:strVal val="visible"/>
+                                      </p:to>
+                                    </p:set>
+                                    <p:animEffect transition="in" filter="fade">
+                                      <p:cBhvr>
+                                        <p:cTn id="27" dur="500"/>
+                                        <p:tgtEl>
+                                          <p:spTgt spid="1029"/>
+                                        </p:tgtEl>
+                                      </p:cBhvr>
+                                    </p:animEffect>
+                                  </p:childTnLst>
+                                </p:cTn>
+                              </p:par>
+                            </p:childTnLst>
+                          </p:cTn>
+                        </p:par>
+                      </p:childTnLst>
+                    </p:cTn>
+                  </p:par>
+                  <p:par>
+                    <p:cTn id="28" fill="hold">
+                      <p:stCondLst>
+                        <p:cond delay="indefinite"/>
+                      </p:stCondLst>
+                      <p:childTnLst>
+                        <p:par>
+                          <p:cTn id="29" fill="hold">
+                            <p:stCondLst>
+                              <p:cond delay="0"/>
+                            </p:stCondLst>
+                            <p:childTnLst>
+                              <p:par>
+                                <p:cTn id="30" presetID="42" presetClass="path" presetSubtype="0" repeatCount="indefinite" accel="50000" decel="50000" autoRev="1" fill="hold" nodeType="clickEffect">
+                                  <p:stCondLst>
+                                    <p:cond delay="0"/>
+                                  </p:stCondLst>
+                                  <p:endCondLst>
+                                    <p:cond evt="onNext" delay="0">
+                                      <p:tgtEl>
+                                        <p:sldTgt/>
+                                      </p:tgtEl>
+                                    </p:cond>
+                                  </p:endCondLst>
+                                  <p:childTnLst>
+                                    <p:animMotion origin="layout" path="M 3.88889E-6 -1.46341E-6 L 0.41684 0.00371 " pathEditMode="relative" rAng="0" ptsTypes="AA">
+                                      <p:cBhvr>
+                                        <p:cTn id="31" dur="2000" fill="hold"/>
+                                        <p:tgtEl>
+                                          <p:spTgt spid="1029"/>
+                                        </p:tgtEl>
+                                        <p:attrNameLst>
+                                          <p:attrName>ppt_x</p:attrName>
+                                          <p:attrName>ppt_y</p:attrName>
+                                        </p:attrNameLst>
+                                      </p:cBhvr>
+                                      <p:rCtr x="20833" y="185"/>
+                                    </p:animMotion>
+                                  </p:childTnLst>
+                                </p:cTn>
+                              </p:par>
+                              <p:par>
+                                <p:cTn id="32" presetID="32" presetClass="emph" presetSubtype="0" fill="hold" nodeType="withEffect">
+                                  <p:stCondLst>
+                                    <p:cond delay="0"/>
+                                  </p:stCondLst>
+                                  <p:childTnLst>
+                                    <p:animRot by="120000">
+                                      <p:cBhvr>
+                                        <p:cTn id="33" dur="100" fill="hold">
+                                          <p:stCondLst>
+                                            <p:cond delay="0"/>
+                                          </p:stCondLst>
+                                        </p:cTn>
+                                        <p:tgtEl>
+                                          <p:spTgt spid="1029"/>
+                                        </p:tgtEl>
+                                        <p:attrNameLst>
+                                          <p:attrName>r</p:attrName>
+                                        </p:attrNameLst>
+                                      </p:cBhvr>
+                                    </p:animRot>
+                                    <p:animRot by="-240000">
+                                      <p:cBhvr>
+                                        <p:cTn id="34" dur="200" fill="hold">
+                                          <p:stCondLst>
+                                            <p:cond delay="200"/>
+                                          </p:stCondLst>
+                                        </p:cTn>
+                                        <p:tgtEl>
+                                          <p:spTgt spid="1029"/>
+                                        </p:tgtEl>
+                                        <p:attrNameLst>
+                                          <p:attrName>r</p:attrName>
+                                        </p:attrNameLst>
+                                      </p:cBhvr>
+                                    </p:animRot>
+                                    <p:animRot by="240000">
+                                      <p:cBhvr>
+                                        <p:cTn id="35" dur="200" fill="hold">
+                                          <p:stCondLst>
+                                            <p:cond delay="400"/>
+                                          </p:stCondLst>
+                                        </p:cTn>
+                                        <p:tgtEl>
+                                          <p:spTgt spid="1029"/>
+                                        </p:tgtEl>
+                                        <p:attrNameLst>
+                                          <p:attrName>r</p:attrName>
+                                        </p:attrNameLst>
+                                      </p:cBhvr>
+                                    </p:animRot>
+                                    <p:animRot by="-240000">
+                                      <p:cBhvr>
+                                        <p:cTn id="36" dur="200" fill="hold">
+                                          <p:stCondLst>
+                                            <p:cond delay="600"/>
+                                          </p:stCondLst>
+                                        </p:cTn>
+                                        <p:tgtEl>
+                                          <p:spTgt spid="1029"/>
+                                        </p:tgtEl>
+                                        <p:attrNameLst>
+                                          <p:attrName>r</p:attrName>
+                                        </p:attrNameLst>
+                                      </p:cBhvr>
+                                    </p:animRot>
+                                    <p:animRot by="120000">
+                                      <p:cBhvr>
+                                        <p:cTn id="37" dur="200" fill="hold">
+                                          <p:stCondLst>
+                                            <p:cond delay="800"/>
+                                          </p:stCondLst>
+                                        </p:cTn>
+                                        <p:tgtEl>
+                                          <p:spTgt spid="1029"/>
+                                        </p:tgtEl>
+                                        <p:attrNameLst>
+                                          <p:attrName>r</p:attrName>
+                                        </p:attrNameLst>
+                                      </p:cBhvr>
+                                    </p:animRot>
+                                  </p:childTnLst>
+                                </p:cTn>
+                              </p:par>
+                            </p:childTnLst>
+                          </p:cTn>
+                        </p:par>
+                      </p:childTnLst>
+                    </p:cTn>
+                  </p:par>
+                  <p:par>
+                    <p:cTn id="38" fill="hold">
+                      <p:stCondLst>
+                        <p:cond delay="indefinite"/>
+                      </p:stCondLst>
+                      <p:childTnLst>
+                        <p:par>
+                          <p:cTn id="39" fill="hold">
+                            <p:stCondLst>
+                              <p:cond delay="0"/>
+                            </p:stCondLst>
+                            <p:childTnLst>
+                              <p:par>
+                                <p:cTn id="40" presetID="10" presetClass="exit" presetSubtype="0" fill="hold" nodeType="clickEffect">
+                                  <p:stCondLst>
+                                    <p:cond delay="0"/>
+                                  </p:stCondLst>
+                                  <p:childTnLst>
+                                    <p:animEffect transition="out" filter="fade">
+                                      <p:cBhvr>
+                                        <p:cTn id="41" dur="500"/>
+                                        <p:tgtEl>
+                                          <p:spTgt spid="1040"/>
+                                        </p:tgtEl>
+                                      </p:cBhvr>
+                                    </p:animEffect>
+                                    <p:set>
+                                      <p:cBhvr>
+                                        <p:cTn id="42" dur="1" fill="hold">
+                                          <p:stCondLst>
+                                            <p:cond delay="499"/>
+                                          </p:stCondLst>
+                                        </p:cTn>
+                                        <p:tgtEl>
+                                          <p:spTgt spid="1040"/>
+                                        </p:tgtEl>
+                                        <p:attrNameLst>
+                                          <p:attrName>style.visibility</p:attrName>
+                                        </p:attrNameLst>
+                                      </p:cBhvr>
+                                      <p:to>
+                                        <p:strVal val="hidden"/>
+                                      </p:to>
+                                    </p:set>
+                                  </p:childTnLst>
+                                </p:cTn>
+                              </p:par>
+                              <p:par>
+                                <p:cTn id="43" presetID="10" presetClass="exit" presetSubtype="0" fill="hold" nodeType="withEffect">
+                                  <p:stCondLst>
+                                    <p:cond delay="0"/>
+                                  </p:stCondLst>
+                                  <p:childTnLst>
+                                    <p:animEffect transition="out" filter="fade">
+                                      <p:cBhvr>
+                                        <p:cTn id="44" dur="500"/>
+                                        <p:tgtEl>
+                                          <p:spTgt spid="1041"/>
+                                        </p:tgtEl>
+                                      </p:cBhvr>
+                                    </p:animEffect>
+                                    <p:set>
+                                      <p:cBhvr>
+                                        <p:cTn id="45" dur="1" fill="hold">
+                                          <p:stCondLst>
+                                            <p:cond delay="499"/>
+                                          </p:stCondLst>
+                                        </p:cTn>
+                                        <p:tgtEl>
+                                          <p:spTgt spid="1041"/>
+                                        </p:tgtEl>
+                                        <p:attrNameLst>
+                                          <p:attrName>style.visibility</p:attrName>
+                                        </p:attrNameLst>
+                                      </p:cBhvr>
+                                      <p:to>
+                                        <p:strVal val="hidden"/>
+                                      </p:to>
+                                    </p:set>
+                                  </p:childTnLst>
+                                </p:cTn>
+                              </p:par>
+                              <p:par>
+                                <p:cTn id="46" presetID="10" presetClass="entr" presetSubtype="0" fill="hold" nodeType="withEffect">
+                                  <p:stCondLst>
+                                    <p:cond delay="0"/>
+                                  </p:stCondLst>
+                                  <p:childTnLst>
+                                    <p:set>
+                                      <p:cBhvr>
+                                        <p:cTn id="47" dur="1" fill="hold">
+                                          <p:stCondLst>
+                                            <p:cond delay="0"/>
+                                          </p:stCondLst>
+                                        </p:cTn>
+                                        <p:tgtEl>
+                                          <p:spTgt spid="1029"/>
+                                        </p:tgtEl>
+                                        <p:attrNameLst>
+                                          <p:attrName>style.visibility</p:attrName>
+                                        </p:attrNameLst>
+                                      </p:cBhvr>
+                                      <p:to>
+                                        <p:strVal val="visible"/>
+                                      </p:to>
+                                    </p:set>
+                                    <p:animEffect transition="in" filter="fade">
+                                      <p:cBhvr>
+                                        <p:cTn id="48" dur="500"/>
+                                        <p:tgtEl>
+                                          <p:spTgt spid="1029"/>
+                                        </p:tgtEl>
+                                      </p:cBhvr>
+                                    </p:animEffect>
+                                  </p:childTnLst>
+                                </p:cTn>
+                              </p:par>
+                              <p:par>
+                                <p:cTn id="49" presetID="10" presetClass="entr" presetSubtype="0" fill="hold" nodeType="withEffect">
+                                  <p:stCondLst>
+                                    <p:cond delay="0"/>
+                                  </p:stCondLst>
+                                  <p:childTnLst>
+                                    <p:set>
+                                      <p:cBhvr>
+                                        <p:cTn id="50" dur="1" fill="hold">
+                                          <p:stCondLst>
+                                            <p:cond delay="0"/>
+                                          </p:stCondLst>
+                                        </p:cTn>
+                                        <p:tgtEl>
+                                          <p:spTgt spid="1039"/>
+                                        </p:tgtEl>
+                                        <p:attrNameLst>
+                                          <p:attrName>style.visibility</p:attrName>
+                                        </p:attrNameLst>
+                                      </p:cBhvr>
+                                      <p:to>
+                                        <p:strVal val="visible"/>
+                                      </p:to>
+                                    </p:set>
+                                    <p:animEffect transition="in" filter="fade">
+                                      <p:cBhvr>
+                                        <p:cTn id="51" dur="500"/>
+                                        <p:tgtEl>
+                                          <p:spTgt spid="1039"/>
+                                        </p:tgtEl>
+                                      </p:cBhvr>
+                                    </p:animEffect>
+                                  </p:childTnLst>
+                                </p:cTn>
+                              </p:par>
+                              <p:par>
+                                <p:cTn id="52" presetID="10" presetClass="entr" presetSubtype="0" fill="hold" nodeType="withEffect">
+                                  <p:stCondLst>
+                                    <p:cond delay="0"/>
+                                  </p:stCondLst>
+                                  <p:childTnLst>
+                                    <p:set>
+                                      <p:cBhvr>
+                                        <p:cTn id="53" dur="1" fill="hold">
+                                          <p:stCondLst>
+                                            <p:cond delay="0"/>
+                                          </p:stCondLst>
+                                        </p:cTn>
+                                        <p:tgtEl>
+                                          <p:spTgt spid="1038"/>
+                                        </p:tgtEl>
+                                        <p:attrNameLst>
+                                          <p:attrName>style.visibility</p:attrName>
+                                        </p:attrNameLst>
+                                      </p:cBhvr>
+                                      <p:to>
+                                        <p:strVal val="visible"/>
+                                      </p:to>
+                                    </p:set>
+                                    <p:animEffect transition="in" filter="fade">
+                                      <p:cBhvr>
+                                        <p:cTn id="54" dur="500"/>
+                                        <p:tgtEl>
+                                          <p:spTgt spid="1038"/>
+                                        </p:tgtEl>
+                                      </p:cBhvr>
+                                    </p:animEffect>
+                                  </p:childTnLst>
+                                </p:cTn>
+                              </p:par>
+                            </p:childTnLst>
+                          </p:cTn>
+                        </p:par>
+                      </p:childTnLst>
+                    </p:cTn>
+                  </p:par>
+                  <p:par>
+                    <p:cTn id="55" fill="hold">
+                      <p:stCondLst>
+                        <p:cond delay="indefinite"/>
+                      </p:stCondLst>
+                      <p:childTnLst>
+                        <p:par>
+                          <p:cTn id="56" fill="hold">
+                            <p:stCondLst>
+                              <p:cond delay="0"/>
+                            </p:stCondLst>
+                            <p:childTnLst>
+                              <p:par>
+                                <p:cTn id="57" presetID="42" presetClass="path" presetSubtype="0" repeatCount="indefinite" accel="50000" decel="50000" autoRev="1" fill="hold" nodeType="clickEffect">
+                                  <p:stCondLst>
+                                    <p:cond delay="0"/>
+                                  </p:stCondLst>
+                                  <p:endCondLst>
+                                    <p:cond evt="onNext" delay="0">
+                                      <p:tgtEl>
+                                        <p:sldTgt/>
+                                      </p:tgtEl>
+                                    </p:cond>
+                                  </p:endCondLst>
+                                  <p:childTnLst>
+                                    <p:animMotion origin="layout" path="M 4.72222E-6 3.68941E-6 L 0.41736 3.68941E-6 " pathEditMode="relative" rAng="0" ptsTypes="AA">
+                                      <p:cBhvr>
+                                        <p:cTn id="58" dur="2000" fill="hold"/>
+                                        <p:tgtEl>
+                                          <p:spTgt spid="1029"/>
+                                        </p:tgtEl>
+                                        <p:attrNameLst>
+                                          <p:attrName>ppt_x</p:attrName>
+                                          <p:attrName>ppt_y</p:attrName>
+                                        </p:attrNameLst>
+                                      </p:cBhvr>
+                                      <p:rCtr x="20868" y="0"/>
+                                    </p:animMotion>
+                                  </p:childTnLst>
+                                </p:cTn>
+                              </p:par>
+                              <p:par>
+                                <p:cTn id="59" presetID="32" presetClass="emph" presetSubtype="0" fill="hold" nodeType="withEffect">
+                                  <p:stCondLst>
+                                    <p:cond delay="0"/>
+                                  </p:stCondLst>
+                                  <p:childTnLst>
+                                    <p:animRot by="120000">
+                                      <p:cBhvr>
+                                        <p:cTn id="60" dur="100" fill="hold">
+                                          <p:stCondLst>
+                                            <p:cond delay="0"/>
+                                          </p:stCondLst>
+                                        </p:cTn>
+                                        <p:tgtEl>
+                                          <p:spTgt spid="1029"/>
+                                        </p:tgtEl>
+                                        <p:attrNameLst>
+                                          <p:attrName>r</p:attrName>
+                                        </p:attrNameLst>
+                                      </p:cBhvr>
+                                    </p:animRot>
+                                    <p:animRot by="-240000">
+                                      <p:cBhvr>
+                                        <p:cTn id="61" dur="200" fill="hold">
+                                          <p:stCondLst>
+                                            <p:cond delay="200"/>
+                                          </p:stCondLst>
+                                        </p:cTn>
+                                        <p:tgtEl>
+                                          <p:spTgt spid="1029"/>
+                                        </p:tgtEl>
+                                        <p:attrNameLst>
+                                          <p:attrName>r</p:attrName>
+                                        </p:attrNameLst>
+                                      </p:cBhvr>
+                                    </p:animRot>
+                                    <p:animRot by="240000">
+                                      <p:cBhvr>
+                                        <p:cTn id="62" dur="200" fill="hold">
+                                          <p:stCondLst>
+                                            <p:cond delay="400"/>
+                                          </p:stCondLst>
+                                        </p:cTn>
+                                        <p:tgtEl>
+                                          <p:spTgt spid="1029"/>
+                                        </p:tgtEl>
+                                        <p:attrNameLst>
+                                          <p:attrName>r</p:attrName>
+                                        </p:attrNameLst>
+                                      </p:cBhvr>
+                                    </p:animRot>
+                                    <p:animRot by="-240000">
+                                      <p:cBhvr>
+                                        <p:cTn id="63" dur="200" fill="hold">
+                                          <p:stCondLst>
+                                            <p:cond delay="600"/>
+                                          </p:stCondLst>
+                                        </p:cTn>
+                                        <p:tgtEl>
+                                          <p:spTgt spid="1029"/>
+                                        </p:tgtEl>
+                                        <p:attrNameLst>
+                                          <p:attrName>r</p:attrName>
+                                        </p:attrNameLst>
+                                      </p:cBhvr>
+                                    </p:animRot>
+                                    <p:animRot by="120000">
+                                      <p:cBhvr>
+                                        <p:cTn id="64" dur="200" fill="hold">
+                                          <p:stCondLst>
+                                            <p:cond delay="800"/>
+                                          </p:stCondLst>
+                                        </p:cTn>
+                                        <p:tgtEl>
+                                          <p:spTgt spid="1029"/>
+                                        </p:tgtEl>
+                                        <p:attrNameLst>
+                                          <p:attrName>r</p:attrName>
+                                        </p:attrNameLst>
+                                      </p:cBhvr>
+                                    </p:animRot>
+                                  </p:childTnLst>
+                                </p:cTn>
+                              </p:par>
+                            </p:childTnLst>
+                          </p:cTn>
+                        </p:par>
+                      </p:childTnLst>
+                    </p:cTn>
+                  </p:par>
+                  <p:par>
+                    <p:cTn id="65" fill="hold">
+                      <p:stCondLst>
+                        <p:cond delay="indefinite"/>
+                      </p:stCondLst>
+                      <p:childTnLst>
+                        <p:par>
+                          <p:cTn id="66" fill="hold">
+                            <p:stCondLst>
+                              <p:cond delay="0"/>
+                            </p:stCondLst>
+                            <p:childTnLst>
+                              <p:par>
+                                <p:cTn id="67" presetID="10" presetClass="exit" presetSubtype="0" fill="hold" nodeType="clickEffect">
+                                  <p:stCondLst>
+                                    <p:cond delay="0"/>
+                                  </p:stCondLst>
+                                  <p:childTnLst>
+                                    <p:animEffect transition="out" filter="fade">
+                                      <p:cBhvr>
+                                        <p:cTn id="68" dur="500"/>
+                                        <p:tgtEl>
+                                          <p:spTgt spid="1039"/>
+                                        </p:tgtEl>
+                                      </p:cBhvr>
+                                    </p:animEffect>
+                                    <p:set>
+                                      <p:cBhvr>
+                                        <p:cTn id="69" dur="1" fill="hold">
+                                          <p:stCondLst>
+                                            <p:cond delay="499"/>
+                                          </p:stCondLst>
+                                        </p:cTn>
+                                        <p:tgtEl>
+                                          <p:spTgt spid="1039"/>
+                                        </p:tgtEl>
+                                        <p:attrNameLst>
+                                          <p:attrName>style.visibility</p:attrName>
+                                        </p:attrNameLst>
+                                      </p:cBhvr>
+                                      <p:to>
+                                        <p:strVal val="hidden"/>
+                                      </p:to>
+                                    </p:set>
+                                  </p:childTnLst>
+                                </p:cTn>
+                              </p:par>
+                              <p:par>
+                                <p:cTn id="70" presetID="10" presetClass="exit" presetSubtype="0" fill="hold" nodeType="withEffect">
+                                  <p:stCondLst>
+                                    <p:cond delay="0"/>
+                                  </p:stCondLst>
+                                  <p:childTnLst>
+                                    <p:animEffect transition="out" filter="fade">
+                                      <p:cBhvr>
+                                        <p:cTn id="71" dur="500"/>
+                                        <p:tgtEl>
+                                          <p:spTgt spid="1038"/>
+                                        </p:tgtEl>
+                                      </p:cBhvr>
+                                    </p:animEffect>
+                                    <p:set>
+                                      <p:cBhvr>
+                                        <p:cTn id="72" dur="1" fill="hold">
+                                          <p:stCondLst>
+                                            <p:cond delay="499"/>
+                                          </p:stCondLst>
+                                        </p:cTn>
+                                        <p:tgtEl>
+                                          <p:spTgt spid="1038"/>
+                                        </p:tgtEl>
+                                        <p:attrNameLst>
+                                          <p:attrName>style.visibility</p:attrName>
+                                        </p:attrNameLst>
+                                      </p:cBhvr>
+                                      <p:to>
+                                        <p:strVal val="hidden"/>
+                                      </p:to>
+                                    </p:set>
+                                  </p:childTnLst>
+                                </p:cTn>
+                              </p:par>
+                              <p:par>
+                                <p:cTn id="73" presetID="10" presetClass="entr" presetSubtype="0" fill="hold" nodeType="withEffect">
+                                  <p:stCondLst>
+                                    <p:cond delay="0"/>
+                                  </p:stCondLst>
+                                  <p:childTnLst>
+                                    <p:set>
+                                      <p:cBhvr>
+                                        <p:cTn id="74" dur="1" fill="hold">
+                                          <p:stCondLst>
+                                            <p:cond delay="0"/>
+                                          </p:stCondLst>
+                                        </p:cTn>
+                                        <p:tgtEl>
+                                          <p:spTgt spid="1027"/>
+                                        </p:tgtEl>
+                                        <p:attrNameLst>
+                                          <p:attrName>style.visibility</p:attrName>
+                                        </p:attrNameLst>
+                                      </p:cBhvr>
+                                      <p:to>
+                                        <p:strVal val="visible"/>
+                                      </p:to>
+                                    </p:set>
+                                    <p:animEffect transition="in" filter="fade">
+                                      <p:cBhvr>
+                                        <p:cTn id="75" dur="500"/>
+                                        <p:tgtEl>
+                                          <p:spTgt spid="1027"/>
+                                        </p:tgtEl>
+                                      </p:cBhvr>
+                                    </p:animEffect>
+                                  </p:childTnLst>
+                                </p:cTn>
+                              </p:par>
+                              <p:par>
+                                <p:cTn id="76" presetID="10" presetClass="entr" presetSubtype="0" fill="hold" nodeType="withEffect">
+                                  <p:stCondLst>
+                                    <p:cond delay="0"/>
+                                  </p:stCondLst>
+                                  <p:childTnLst>
+                                    <p:set>
+                                      <p:cBhvr>
+                                        <p:cTn id="77" dur="1" fill="hold">
+                                          <p:stCondLst>
+                                            <p:cond delay="0"/>
+                                          </p:stCondLst>
+                                        </p:cTn>
+                                        <p:tgtEl>
+                                          <p:spTgt spid="1028"/>
+                                        </p:tgtEl>
+                                        <p:attrNameLst>
+                                          <p:attrName>style.visibility</p:attrName>
+                                        </p:attrNameLst>
+                                      </p:cBhvr>
+                                      <p:to>
+                                        <p:strVal val="visible"/>
+                                      </p:to>
+                                    </p:set>
+                                    <p:animEffect transition="in" filter="fade">
+                                      <p:cBhvr>
+                                        <p:cTn id="78" dur="500"/>
+                                        <p:tgtEl>
+                                          <p:spTgt spid="1028"/>
+                                        </p:tgtEl>
+                                      </p:cBhvr>
+                                    </p:animEffect>
+                                  </p:childTnLst>
+                                </p:cTn>
+                              </p:par>
+                            </p:childTnLst>
+                          </p:cTn>
+                        </p:par>
+                      </p:childTnLst>
+                    </p:cTn>
+                  </p:par>
+                  <p:par>
+                    <p:cTn id="79" fill="hold">
+                      <p:stCondLst>
+                        <p:cond delay="indefinite"/>
+                      </p:stCondLst>
+                      <p:childTnLst>
+                        <p:par>
+                          <p:cTn id="80" fill="hold">
+                            <p:stCondLst>
+                              <p:cond delay="0"/>
+                            </p:stCondLst>
+                            <p:childTnLst>
+                              <p:par>
+                                <p:cTn id="81" presetID="42" presetClass="path" presetSubtype="0" accel="50000" decel="50000" fill="hold" nodeType="clickEffect">
+                                  <p:stCondLst>
+                                    <p:cond delay="0"/>
+                                  </p:stCondLst>
+                                  <p:childTnLst>
+                                    <p:animMotion origin="layout" path="M 4.72222E-6 3.68941E-6 L 0.16545 3.68941E-6 " pathEditMode="relative" rAng="0" ptsTypes="AA">
+                                      <p:cBhvr>
+                                        <p:cTn id="82" dur="2000" fill="hold"/>
+                                        <p:tgtEl>
+                                          <p:spTgt spid="1029"/>
+                                        </p:tgtEl>
+                                        <p:attrNameLst>
+                                          <p:attrName>ppt_x</p:attrName>
+                                          <p:attrName>ppt_y</p:attrName>
+                                        </p:attrNameLst>
+                                      </p:cBhvr>
+                                      <p:rCtr x="8264" y="0"/>
+                                    </p:animMotion>
+                                  </p:childTnLst>
+                                </p:cTn>
+                              </p:par>
+                              <p:par>
+                                <p:cTn id="83" presetID="32" presetClass="emph" presetSubtype="0" repeatCount="indefinite" fill="hold" nodeType="withEffect">
+                                  <p:stCondLst>
+                                    <p:cond delay="0"/>
+                                  </p:stCondLst>
+                                  <p:endCondLst>
+                                    <p:cond evt="onNext" delay="0">
+                                      <p:tgtEl>
+                                        <p:sldTgt/>
+                                      </p:tgtEl>
+                                    </p:cond>
+                                  </p:endCondLst>
+                                  <p:childTnLst>
+                                    <p:animRot by="120000">
+                                      <p:cBhvr>
+                                        <p:cTn id="84" dur="100" fill="hold">
+                                          <p:stCondLst>
+                                            <p:cond delay="0"/>
+                                          </p:stCondLst>
+                                        </p:cTn>
+                                        <p:tgtEl>
+                                          <p:spTgt spid="1029"/>
+                                        </p:tgtEl>
+                                        <p:attrNameLst>
+                                          <p:attrName>r</p:attrName>
+                                        </p:attrNameLst>
+                                      </p:cBhvr>
+                                    </p:animRot>
+                                    <p:animRot by="-240000">
+                                      <p:cBhvr>
+                                        <p:cTn id="85" dur="200" fill="hold">
+                                          <p:stCondLst>
+                                            <p:cond delay="200"/>
+                                          </p:stCondLst>
+                                        </p:cTn>
+                                        <p:tgtEl>
+                                          <p:spTgt spid="1029"/>
+                                        </p:tgtEl>
+                                        <p:attrNameLst>
+                                          <p:attrName>r</p:attrName>
+                                        </p:attrNameLst>
+                                      </p:cBhvr>
+                                    </p:animRot>
+                                    <p:animRot by="240000">
+                                      <p:cBhvr>
+                                        <p:cTn id="86" dur="200" fill="hold">
+                                          <p:stCondLst>
+                                            <p:cond delay="400"/>
+                                          </p:stCondLst>
+                                        </p:cTn>
+                                        <p:tgtEl>
+                                          <p:spTgt spid="1029"/>
+                                        </p:tgtEl>
+                                        <p:attrNameLst>
+                                          <p:attrName>r</p:attrName>
+                                        </p:attrNameLst>
+                                      </p:cBhvr>
+                                    </p:animRot>
+                                    <p:animRot by="-240000">
+                                      <p:cBhvr>
+                                        <p:cTn id="87" dur="200" fill="hold">
+                                          <p:stCondLst>
+                                            <p:cond delay="600"/>
+                                          </p:stCondLst>
+                                        </p:cTn>
+                                        <p:tgtEl>
+                                          <p:spTgt spid="1029"/>
+                                        </p:tgtEl>
+                                        <p:attrNameLst>
+                                          <p:attrName>r</p:attrName>
+                                        </p:attrNameLst>
+                                      </p:cBhvr>
+                                    </p:animRot>
+                                    <p:animRot by="120000">
+                                      <p:cBhvr>
+                                        <p:cTn id="88" dur="200" fill="hold">
+                                          <p:stCondLst>
+                                            <p:cond delay="800"/>
+                                          </p:stCondLst>
+                                        </p:cTn>
+                                        <p:tgtEl>
+                                          <p:spTgt spid="1029"/>
+                                        </p:tgtEl>
+                                        <p:attrNameLst>
+                                          <p:attrName>r</p:attrName>
+                                        </p:attrNameLst>
+                                      </p:cBhvr>
+                                    </p:animRot>
+                                  </p:childTnLst>
+                                </p:cTn>
+                              </p:par>
+                            </p:childTnLst>
+                          </p:cTn>
+                        </p:par>
+                      </p:childTnLst>
+                    </p:cTn>
+                  </p:par>
+                  <p:par>
+                    <p:cTn id="89" fill="hold">
+                      <p:stCondLst>
+                        <p:cond delay="indefinite"/>
+                      </p:stCondLst>
+                      <p:childTnLst>
+                        <p:par>
+                          <p:cTn id="90" fill="hold">
+                            <p:stCondLst>
+                              <p:cond delay="0"/>
+                            </p:stCondLst>
+                            <p:childTnLst>
+                              <p:par>
+                                <p:cTn id="91" presetID="10" presetClass="entr" presetSubtype="0" fill="hold" grpId="0" nodeType="clickEffect">
+                                  <p:stCondLst>
+                                    <p:cond delay="0"/>
+                                  </p:stCondLst>
+                                  <p:childTnLst>
+                                    <p:set>
+                                      <p:cBhvr>
+                                        <p:cTn id="92" dur="1" fill="hold">
+                                          <p:stCondLst>
+                                            <p:cond delay="0"/>
+                                          </p:stCondLst>
+                                        </p:cTn>
+                                        <p:tgtEl>
+                                          <p:spTgt spid="14"/>
+                                        </p:tgtEl>
+                                        <p:attrNameLst>
+                                          <p:attrName>style.visibility</p:attrName>
+                                        </p:attrNameLst>
+                                      </p:cBhvr>
+                                      <p:to>
+                                        <p:strVal val="visible"/>
+                                      </p:to>
+                                    </p:set>
+                                    <p:animEffect transition="in" filter="fade">
+                                      <p:cBhvr>
+                                        <p:cTn id="93" dur="500"/>
+                                        <p:tgtEl>
+                                          <p:spTgt spid="14"/>
+                                        </p:tgtEl>
+                                      </p:cBhvr>
+                                    </p:animEffect>
+                                  </p:childTnLst>
+                                </p:cTn>
+                              </p:par>
+                              <p:par>
+                                <p:cTn id="94" presetID="10" presetClass="entr" presetSubtype="0" fill="hold" nodeType="withEffect">
+                                  <p:stCondLst>
+                                    <p:cond delay="0"/>
+                                  </p:stCondLst>
+                                  <p:childTnLst>
+                                    <p:set>
+                                      <p:cBhvr>
+                                        <p:cTn id="95" dur="1" fill="hold">
+                                          <p:stCondLst>
+                                            <p:cond delay="0"/>
+                                          </p:stCondLst>
+                                        </p:cTn>
+                                        <p:tgtEl>
+                                          <p:spTgt spid="1030"/>
+                                        </p:tgtEl>
+                                        <p:attrNameLst>
+                                          <p:attrName>style.visibility</p:attrName>
+                                        </p:attrNameLst>
+                                      </p:cBhvr>
+                                      <p:to>
+                                        <p:strVal val="visible"/>
+                                      </p:to>
+                                    </p:set>
+                                    <p:animEffect transition="in" filter="fade">
+                                      <p:cBhvr>
+                                        <p:cTn id="96" dur="500"/>
+                                        <p:tgtEl>
+                                          <p:spTgt spid="1030"/>
+                                        </p:tgtEl>
+                                      </p:cBhvr>
+                                    </p:animEffect>
+                                  </p:childTnLst>
+                                </p:cTn>
+                              </p:par>
+                              <p:par>
+                                <p:cTn id="97" presetID="10" presetClass="entr" presetSubtype="0" fill="hold" nodeType="withEffect">
+                                  <p:stCondLst>
+                                    <p:cond delay="0"/>
+                                  </p:stCondLst>
+                                  <p:childTnLst>
+                                    <p:set>
+                                      <p:cBhvr>
+                                        <p:cTn id="98" dur="1" fill="hold">
+                                          <p:stCondLst>
+                                            <p:cond delay="0"/>
+                                          </p:stCondLst>
+                                        </p:cTn>
+                                        <p:tgtEl>
+                                          <p:spTgt spid="1031"/>
+                                        </p:tgtEl>
+                                        <p:attrNameLst>
+                                          <p:attrName>style.visibility</p:attrName>
+                                        </p:attrNameLst>
+                                      </p:cBhvr>
+                                      <p:to>
+                                        <p:strVal val="visible"/>
+                                      </p:to>
+                                    </p:set>
+                                    <p:animEffect transition="in" filter="fade">
+                                      <p:cBhvr>
+                                        <p:cTn id="99" dur="500"/>
+                                        <p:tgtEl>
+                                          <p:spTgt spid="1031"/>
+                                        </p:tgtEl>
+                                      </p:cBhvr>
+                                    </p:animEffect>
+                                  </p:childTnLst>
+                                </p:cTn>
+                              </p:par>
+                            </p:childTnLst>
+                          </p:cTn>
+                        </p:par>
+                      </p:childTnLst>
+                    </p:cTn>
+                  </p:par>
+                  <p:par>
+                    <p:cTn id="100" fill="hold">
+                      <p:stCondLst>
+                        <p:cond delay="indefinite"/>
+                      </p:stCondLst>
+                      <p:childTnLst>
+                        <p:par>
+                          <p:cTn id="101" fill="hold">
+                            <p:stCondLst>
+                              <p:cond delay="0"/>
+                            </p:stCondLst>
+                            <p:childTnLst>
+                              <p:par>
+                                <p:cTn id="102" presetID="10" presetClass="entr" presetSubtype="0" fill="hold" nodeType="clickEffect">
+                                  <p:stCondLst>
+                                    <p:cond delay="0"/>
+                                  </p:stCondLst>
+                                  <p:childTnLst>
+                                    <p:set>
+                                      <p:cBhvr>
+                                        <p:cTn id="103" dur="1" fill="hold">
+                                          <p:stCondLst>
+                                            <p:cond delay="0"/>
+                                          </p:stCondLst>
+                                        </p:cTn>
+                                        <p:tgtEl>
+                                          <p:spTgt spid="1044"/>
+                                        </p:tgtEl>
+                                        <p:attrNameLst>
+                                          <p:attrName>style.visibility</p:attrName>
+                                        </p:attrNameLst>
+                                      </p:cBhvr>
+                                      <p:to>
+                                        <p:strVal val="visible"/>
+                                      </p:to>
+                                    </p:set>
+                                    <p:animEffect transition="in" filter="fade">
+                                      <p:cBhvr>
+                                        <p:cTn id="104" dur="500"/>
+                                        <p:tgtEl>
+                                          <p:spTgt spid="1044"/>
+                                        </p:tgtEl>
+                                      </p:cBhvr>
+                                    </p:animEffect>
+                                  </p:childTnLst>
+                                </p:cTn>
+                              </p:par>
+                            </p:childTnLst>
+                          </p:cTn>
+                        </p:par>
+                      </p:childTnLst>
+                    </p:cTn>
+                  </p:par>
+                  <p:par>
+                    <p:cTn id="105" fill="hold">
+                      <p:stCondLst>
+                        <p:cond delay="indefinite"/>
+                      </p:stCondLst>
+                      <p:childTnLst>
+                        <p:par>
+                          <p:cTn id="106" fill="hold">
+                            <p:stCondLst>
+                              <p:cond delay="0"/>
+                            </p:stCondLst>
+                            <p:childTnLst>
+                              <p:par>
+                                <p:cTn id="107" presetID="10" presetClass="entr" presetSubtype="0" fill="hold" nodeType="clickEffect">
+                                  <p:stCondLst>
+                                    <p:cond delay="0"/>
+                                  </p:stCondLst>
+                                  <p:childTnLst>
+                                    <p:set>
+                                      <p:cBhvr>
+                                        <p:cTn id="108" dur="1" fill="hold">
+                                          <p:stCondLst>
+                                            <p:cond delay="0"/>
+                                          </p:stCondLst>
+                                        </p:cTn>
+                                        <p:tgtEl>
+                                          <p:spTgt spid="1033"/>
+                                        </p:tgtEl>
+                                        <p:attrNameLst>
+                                          <p:attrName>style.visibility</p:attrName>
+                                        </p:attrNameLst>
+                                      </p:cBhvr>
+                                      <p:to>
+                                        <p:strVal val="visible"/>
+                                      </p:to>
+                                    </p:set>
+                                    <p:animEffect transition="in" filter="fade">
+                                      <p:cBhvr>
+                                        <p:cTn id="109" dur="500"/>
+                                        <p:tgtEl>
+                                          <p:spTgt spid="1033"/>
+                                        </p:tgtEl>
+                                      </p:cBhvr>
+                                    </p:animEffect>
+                                  </p:childTnLst>
+                                </p:cTn>
+                              </p:par>
+                            </p:childTnLst>
+                          </p:cTn>
+                        </p:par>
+                      </p:childTnLst>
+                    </p:cTn>
+                  </p:par>
+                  <p:par>
+                    <p:cTn id="110" fill="hold">
+                      <p:stCondLst>
+                        <p:cond delay="indefinite"/>
+                      </p:stCondLst>
+                      <p:childTnLst>
+                        <p:par>
+                          <p:cTn id="111" fill="hold">
+                            <p:stCondLst>
+                              <p:cond delay="0"/>
+                            </p:stCondLst>
+                            <p:childTnLst>
+                              <p:par>
+                                <p:cTn id="112" presetID="10" presetClass="entr" presetSubtype="0" fill="hold" nodeType="clickEffect">
+                                  <p:stCondLst>
+                                    <p:cond delay="0"/>
+                                  </p:stCondLst>
+                                  <p:childTnLst>
+                                    <p:set>
+                                      <p:cBhvr>
+                                        <p:cTn id="113" dur="1" fill="hold">
+                                          <p:stCondLst>
+                                            <p:cond delay="0"/>
+                                          </p:stCondLst>
+                                        </p:cTn>
+                                        <p:tgtEl>
+                                          <p:spTgt spid="1043"/>
+                                        </p:tgtEl>
+                                        <p:attrNameLst>
+                                          <p:attrName>style.visibility</p:attrName>
+                                        </p:attrNameLst>
+                                      </p:cBhvr>
+                                      <p:to>
+                                        <p:strVal val="visible"/>
+                                      </p:to>
+                                    </p:set>
+                                    <p:animEffect transition="in" filter="fade">
+                                      <p:cBhvr>
+                                        <p:cTn id="114" dur="500"/>
+                                        <p:tgtEl>
+                                          <p:spTgt spid="1043"/>
+                                        </p:tgtEl>
+                                      </p:cBhvr>
+                                    </p:animEffect>
+                                  </p:childTnLst>
+                                </p:cTn>
+                              </p:par>
+                            </p:childTnLst>
+                          </p:cTn>
+                        </p:par>
+                      </p:childTnLst>
+                    </p:cTn>
+                  </p:par>
+                  <p:par>
+                    <p:cTn id="115" fill="hold">
+                      <p:stCondLst>
+                        <p:cond delay="indefinite"/>
+                      </p:stCondLst>
+                      <p:childTnLst>
+                        <p:par>
+                          <p:cTn id="116" fill="hold">
+                            <p:stCondLst>
+                              <p:cond delay="0"/>
+                            </p:stCondLst>
+                            <p:childTnLst>
+                              <p:par>
+                                <p:cTn id="117" presetID="10" presetClass="entr" presetSubtype="0" fill="hold" nodeType="clickEffect">
+                                  <p:stCondLst>
+                                    <p:cond delay="0"/>
+                                  </p:stCondLst>
+                                  <p:childTnLst>
+                                    <p:set>
+                                      <p:cBhvr>
+                                        <p:cTn id="118" dur="1" fill="hold">
+                                          <p:stCondLst>
+                                            <p:cond delay="0"/>
+                                          </p:stCondLst>
+                                        </p:cTn>
+                                        <p:tgtEl>
+                                          <p:spTgt spid="1034"/>
+                                        </p:tgtEl>
+                                        <p:attrNameLst>
+                                          <p:attrName>style.visibility</p:attrName>
+                                        </p:attrNameLst>
+                                      </p:cBhvr>
+                                      <p:to>
+                                        <p:strVal val="visible"/>
+                                      </p:to>
+                                    </p:set>
+                                    <p:animEffect transition="in" filter="fade">
+                                      <p:cBhvr>
+                                        <p:cTn id="119" dur="500"/>
+                                        <p:tgtEl>
+                                          <p:spTgt spid="1034"/>
+                                        </p:tgtEl>
+                                      </p:cBhvr>
+                                    </p:animEffect>
+                                  </p:childTnLst>
+                                </p:cTn>
+                              </p:par>
+                            </p:childTnLst>
+                          </p:cTn>
+                        </p:par>
+                      </p:childTnLst>
+                    </p:cTn>
+                  </p:par>
+                  <p:par>
+                    <p:cTn id="120" fill="hold">
+                      <p:stCondLst>
+                        <p:cond delay="indefinite"/>
+                      </p:stCondLst>
+                      <p:childTnLst>
+                        <p:par>
+                          <p:cTn id="121" fill="hold">
+                            <p:stCondLst>
+                              <p:cond delay="0"/>
+                            </p:stCondLst>
+                            <p:childTnLst>
+                              <p:par>
+                                <p:cTn id="122" presetID="10" presetClass="entr" presetSubtype="0" fill="hold" nodeType="clickEffect">
+                                  <p:stCondLst>
+                                    <p:cond delay="0"/>
+                                  </p:stCondLst>
+                                  <p:childTnLst>
+                                    <p:set>
+                                      <p:cBhvr>
+                                        <p:cTn id="123" dur="1" fill="hold">
+                                          <p:stCondLst>
+                                            <p:cond delay="0"/>
+                                          </p:stCondLst>
+                                        </p:cTn>
+                                        <p:tgtEl>
+                                          <p:spTgt spid="1035"/>
+                                        </p:tgtEl>
+                                        <p:attrNameLst>
+                                          <p:attrName>style.visibility</p:attrName>
+                                        </p:attrNameLst>
+                                      </p:cBhvr>
+                                      <p:to>
+                                        <p:strVal val="visible"/>
+                                      </p:to>
+                                    </p:set>
+                                    <p:animEffect transition="in" filter="fade">
+                                      <p:cBhvr>
+                                        <p:cTn id="124" dur="500"/>
+                                        <p:tgtEl>
+                                          <p:spTgt spid="1035"/>
+                                        </p:tgtEl>
+                                      </p:cBhvr>
+                                    </p:animEffect>
+                                  </p:childTnLst>
+                                </p:cTn>
+                              </p:par>
+                            </p:childTnLst>
+                          </p:cTn>
+                        </p:par>
+                      </p:childTnLst>
+                    </p:cTn>
+                  </p:par>
+                  <p:par>
+                    <p:cTn id="125" fill="hold">
+                      <p:stCondLst>
+                        <p:cond delay="indefinite"/>
+                      </p:stCondLst>
+                      <p:childTnLst>
+                        <p:par>
+                          <p:cTn id="126" fill="hold">
+                            <p:stCondLst>
+                              <p:cond delay="0"/>
+                            </p:stCondLst>
+                            <p:childTnLst>
+                              <p:par>
+                                <p:cTn id="127" presetID="10" presetClass="entr" presetSubtype="0" fill="hold" nodeType="clickEffect">
+                                  <p:stCondLst>
+                                    <p:cond delay="0"/>
+                                  </p:stCondLst>
+                                  <p:childTnLst>
+                                    <p:set>
+                                      <p:cBhvr>
+                                        <p:cTn id="128" dur="1" fill="hold">
+                                          <p:stCondLst>
+                                            <p:cond delay="0"/>
+                                          </p:stCondLst>
+                                        </p:cTn>
+                                        <p:tgtEl>
+                                          <p:spTgt spid="1037"/>
+                                        </p:tgtEl>
+                                        <p:attrNameLst>
+                                          <p:attrName>style.visibility</p:attrName>
+                                        </p:attrNameLst>
+                                      </p:cBhvr>
+                                      <p:to>
+                                        <p:strVal val="visible"/>
+                                      </p:to>
+                                    </p:set>
+                                    <p:animEffect transition="in" filter="fade">
+                                      <p:cBhvr>
+                                        <p:cTn id="129" dur="500"/>
+                                        <p:tgtEl>
+                                          <p:spTgt spid="1037"/>
+                                        </p:tgtEl>
+                                      </p:cBhvr>
+                                    </p:animEffect>
+                                  </p:childTnLst>
+                                </p:cTn>
+                              </p:par>
+                            </p:childTnLst>
+                          </p:cTn>
+                        </p:par>
+                      </p:childTnLst>
+                    </p:cTn>
+                  </p:par>
+                  <p:par>
+                    <p:cTn id="130" fill="hold">
+                      <p:stCondLst>
+                        <p:cond delay="indefinite"/>
+                      </p:stCondLst>
+                      <p:childTnLst>
+                        <p:par>
+                          <p:cTn id="131" fill="hold">
+                            <p:stCondLst>
+                              <p:cond delay="0"/>
+                            </p:stCondLst>
+                            <p:childTnLst>
+                              <p:par>
+                                <p:cTn id="132" presetID="10" presetClass="entr" presetSubtype="0" fill="hold" grpId="0" nodeType="clickEffect">
+                                  <p:stCondLst>
+                                    <p:cond delay="0"/>
+                                  </p:stCondLst>
+                                  <p:childTnLst>
+                                    <p:set>
+                                      <p:cBhvr>
+                                        <p:cTn id="133" dur="1" fill="hold">
+                                          <p:stCondLst>
+                                            <p:cond delay="0"/>
+                                          </p:stCondLst>
+                                        </p:cTn>
+                                        <p:tgtEl>
+                                          <p:spTgt spid="15"/>
+                                        </p:tgtEl>
+                                        <p:attrNameLst>
+                                          <p:attrName>style.visibility</p:attrName>
+                                        </p:attrNameLst>
+                                      </p:cBhvr>
+                                      <p:to>
+                                        <p:strVal val="visible"/>
+                                      </p:to>
+                                    </p:set>
+                                    <p:animEffect transition="in" filter="fade">
+                                      <p:cBhvr>
+                                        <p:cTn id="134" dur="500"/>
+                                        <p:tgtEl>
+                                          <p:spTgt spid="15"/>
+                                        </p:tgtEl>
+                                      </p:cBhvr>
+                                    </p:animEffect>
+                                  </p:childTnLst>
+                                </p:cTn>
+                              </p:par>
+                              <p:par>
+                                <p:cTn id="135" presetID="10" presetClass="entr" presetSubtype="0" fill="hold" grpId="0" nodeType="withEffect">
+                                  <p:stCondLst>
+                                    <p:cond delay="0"/>
+                                  </p:stCondLst>
+                                  <p:childTnLst>
+                                    <p:set>
+                                      <p:cBhvr>
+                                        <p:cTn id="136" dur="1" fill="hold">
+                                          <p:stCondLst>
+                                            <p:cond delay="0"/>
+                                          </p:stCondLst>
+                                        </p:cTn>
+                                        <p:tgtEl>
+                                          <p:spTgt spid="32"/>
+                                        </p:tgtEl>
+                                        <p:attrNameLst>
+                                          <p:attrName>style.visibility</p:attrName>
+                                        </p:attrNameLst>
+                                      </p:cBhvr>
+                                      <p:to>
+                                        <p:strVal val="visible"/>
+                                      </p:to>
+                                    </p:set>
+                                    <p:animEffect transition="in" filter="fade">
+                                      <p:cBhvr>
+                                        <p:cTn id="137" dur="500"/>
+                                        <p:tgtEl>
+                                          <p:spTgt spid="32"/>
+                                        </p:tgtEl>
+                                      </p:cBhvr>
+                                    </p:animEffect>
+                                  </p:childTnLst>
+                                </p:cTn>
+                              </p:par>
+                              <p:par>
+                                <p:cTn id="138" presetID="10" presetClass="entr" presetSubtype="0" fill="hold" grpId="0" nodeType="withEffect">
+                                  <p:stCondLst>
+                                    <p:cond delay="0"/>
+                                  </p:stCondLst>
+                                  <p:childTnLst>
+                                    <p:set>
+                                      <p:cBhvr>
+                                        <p:cTn id="139" dur="1" fill="hold">
+                                          <p:stCondLst>
+                                            <p:cond delay="0"/>
+                                          </p:stCondLst>
+                                        </p:cTn>
+                                        <p:tgtEl>
+                                          <p:spTgt spid="33"/>
+                                        </p:tgtEl>
+                                        <p:attrNameLst>
+                                          <p:attrName>style.visibility</p:attrName>
+                                        </p:attrNameLst>
+                                      </p:cBhvr>
+                                      <p:to>
+                                        <p:strVal val="visible"/>
+                                      </p:to>
+                                    </p:set>
+                                    <p:animEffect transition="in" filter="fade">
+                                      <p:cBhvr>
+                                        <p:cTn id="140" dur="500"/>
+                                        <p:tgtEl>
+                                          <p:spTgt spid="33"/>
+                                        </p:tgtEl>
+                                      </p:cBhvr>
+                                    </p:animEffect>
+                                  </p:childTnLst>
+                                </p:cTn>
+                              </p:par>
+                            </p:childTnLst>
+                          </p:cTn>
+                        </p:par>
+                      </p:childTnLst>
+                    </p:cTn>
+                  </p:par>
+                  <p:par>
+                    <p:cTn id="141" fill="hold">
+                      <p:stCondLst>
+                        <p:cond delay="indefinite"/>
+                      </p:stCondLst>
+                      <p:childTnLst>
+                        <p:par>
+                          <p:cTn id="142" fill="hold">
+                            <p:stCondLst>
+                              <p:cond delay="0"/>
+                            </p:stCondLst>
+                            <p:childTnLst>
+                              <p:par>
+                                <p:cTn id="143" presetID="10" presetClass="entr" presetSubtype="0" fill="hold" grpId="0" nodeType="clickEffect">
+                                  <p:stCondLst>
+                                    <p:cond delay="0"/>
+                                  </p:stCondLst>
+                                  <p:childTnLst>
+                                    <p:set>
+                                      <p:cBhvr>
+                                        <p:cTn id="144" dur="1" fill="hold">
+                                          <p:stCondLst>
+                                            <p:cond delay="0"/>
+                                          </p:stCondLst>
+                                        </p:cTn>
+                                        <p:tgtEl>
+                                          <p:spTgt spid="36"/>
+                                        </p:tgtEl>
+                                        <p:attrNameLst>
+                                          <p:attrName>style.visibility</p:attrName>
+                                        </p:attrNameLst>
+                                      </p:cBhvr>
+                                      <p:to>
+                                        <p:strVal val="visible"/>
+                                      </p:to>
+                                    </p:set>
+                                    <p:animEffect transition="in" filter="fade">
+                                      <p:cBhvr>
+                                        <p:cTn id="145" dur="500"/>
+                                        <p:tgtEl>
+                                          <p:spTgt spid="36"/>
+                                        </p:tgtEl>
+                                      </p:cBhvr>
+                                    </p:animEffect>
+                                  </p:childTnLst>
+                                </p:cTn>
+                              </p:par>
+                              <p:par>
+                                <p:cTn id="146" presetID="10" presetClass="entr" presetSubtype="0" fill="hold" grpId="0" nodeType="withEffect">
+                                  <p:stCondLst>
+                                    <p:cond delay="0"/>
+                                  </p:stCondLst>
+                                  <p:childTnLst>
+                                    <p:set>
+                                      <p:cBhvr>
+                                        <p:cTn id="147" dur="1" fill="hold">
+                                          <p:stCondLst>
+                                            <p:cond delay="0"/>
+                                          </p:stCondLst>
+                                        </p:cTn>
+                                        <p:tgtEl>
+                                          <p:spTgt spid="35"/>
+                                        </p:tgtEl>
+                                        <p:attrNameLst>
+                                          <p:attrName>style.visibility</p:attrName>
+                                        </p:attrNameLst>
+                                      </p:cBhvr>
+                                      <p:to>
+                                        <p:strVal val="visible"/>
+                                      </p:to>
+                                    </p:set>
+                                    <p:animEffect transition="in" filter="fade">
+                                      <p:cBhvr>
+                                        <p:cTn id="148" dur="500"/>
+                                        <p:tgtEl>
+                                          <p:spTgt spid="35"/>
+                                        </p:tgtEl>
+                                      </p:cBhvr>
+                                    </p:animEffect>
+                                  </p:childTnLst>
+                                </p:cTn>
+                              </p:par>
+                              <p:par>
+                                <p:cTn id="149" presetID="10" presetClass="entr" presetSubtype="0" fill="hold" grpId="0" nodeType="withEffect">
+                                  <p:stCondLst>
+                                    <p:cond delay="0"/>
+                                  </p:stCondLst>
+                                  <p:childTnLst>
+                                    <p:set>
+                                      <p:cBhvr>
+                                        <p:cTn id="150" dur="1" fill="hold">
+                                          <p:stCondLst>
+                                            <p:cond delay="0"/>
+                                          </p:stCondLst>
+                                        </p:cTn>
+                                        <p:tgtEl>
+                                          <p:spTgt spid="34"/>
+                                        </p:tgtEl>
+                                        <p:attrNameLst>
+                                          <p:attrName>style.visibility</p:attrName>
+                                        </p:attrNameLst>
+                                      </p:cBhvr>
+                                      <p:to>
+                                        <p:strVal val="visible"/>
+                                      </p:to>
+                                    </p:set>
+                                    <p:animEffect transition="in" filter="fade">
+                                      <p:cBhvr>
+                                        <p:cTn id="151" dur="500"/>
+                                        <p:tgtEl>
+                                          <p:spTgt spid="34"/>
+                                        </p:tgtEl>
+                                      </p:cBhvr>
+                                    </p:animEffect>
+                                  </p:childTnLst>
+                                </p:cTn>
+                              </p:par>
+                            </p:childTnLst>
+                          </p:cTn>
+                        </p:par>
+                      </p:childTnLst>
+                    </p:cTn>
+                  </p:par>
+                  <p:par>
+                    <p:cTn id="152" fill="hold">
+                      <p:stCondLst>
+                        <p:cond delay="indefinite"/>
+                      </p:stCondLst>
+                      <p:childTnLst>
+                        <p:par>
+                          <p:cTn id="153" fill="hold">
+                            <p:stCondLst>
+                              <p:cond delay="0"/>
+                            </p:stCondLst>
+                            <p:childTnLst>
+                              <p:par>
+                                <p:cTn id="154" presetID="10" presetClass="entr" presetSubtype="0" fill="hold" grpId="0" nodeType="clickEffect">
+                                  <p:stCondLst>
+                                    <p:cond delay="0"/>
+                                  </p:stCondLst>
+                                  <p:childTnLst>
+                                    <p:set>
+                                      <p:cBhvr>
+                                        <p:cTn id="155" dur="1" fill="hold">
+                                          <p:stCondLst>
+                                            <p:cond delay="0"/>
+                                          </p:stCondLst>
+                                        </p:cTn>
+                                        <p:tgtEl>
+                                          <p:spTgt spid="37"/>
+                                        </p:tgtEl>
+                                        <p:attrNameLst>
+                                          <p:attrName>style.visibility</p:attrName>
+                                        </p:attrNameLst>
+                                      </p:cBhvr>
+                                      <p:to>
+                                        <p:strVal val="visible"/>
+                                      </p:to>
+                                    </p:set>
+                                    <p:animEffect transition="in" filter="fade">
+                                      <p:cBhvr>
+                                        <p:cTn id="156" dur="500"/>
+                                        <p:tgtEl>
+                                          <p:spTgt spid="37"/>
+                                        </p:tgtEl>
+                                      </p:cBhvr>
+                                    </p:animEffect>
+                                  </p:childTnLst>
+                                </p:cTn>
+                              </p:par>
+                            </p:childTnLst>
+                          </p:cTn>
+                        </p:par>
+                      </p:childTnLst>
+                    </p:cTn>
+                  </p:par>
+                  <p:par>
+                    <p:cTn id="157" fill="hold">
+                      <p:stCondLst>
+                        <p:cond delay="indefinite"/>
+                      </p:stCondLst>
+                      <p:childTnLst>
+                        <p:par>
+                          <p:cTn id="158" fill="hold">
+                            <p:stCondLst>
+                              <p:cond delay="0"/>
+                            </p:stCondLst>
+                            <p:childTnLst>
+                              <p:par>
+                                <p:cTn id="159" presetID="10" presetClass="entr" presetSubtype="0" fill="hold" grpId="0" nodeType="clickEffect">
+                                  <p:stCondLst>
+                                    <p:cond delay="0"/>
+                                  </p:stCondLst>
+                                  <p:childTnLst>
+                                    <p:set>
+                                      <p:cBhvr>
+                                        <p:cTn id="160" dur="1" fill="hold">
+                                          <p:stCondLst>
+                                            <p:cond delay="0"/>
+                                          </p:stCondLst>
+                                        </p:cTn>
+                                        <p:tgtEl>
+                                          <p:spTgt spid="39"/>
+                                        </p:tgtEl>
+                                        <p:attrNameLst>
+                                          <p:attrName>style.visibility</p:attrName>
+                                        </p:attrNameLst>
+                                      </p:cBhvr>
+                                      <p:to>
+                                        <p:strVal val="visible"/>
+                                      </p:to>
+                                    </p:set>
+                                    <p:animEffect transition="in" filter="fade">
+                                      <p:cBhvr>
+                                        <p:cTn id="161" dur="500"/>
+                                        <p:tgtEl>
+                                          <p:spTgt spid="39"/>
+                                        </p:tgtEl>
+                                      </p:cBhvr>
+                                    </p:animEffect>
+                                  </p:childTnLst>
+                                </p:cTn>
+                              </p:par>
+                            </p:childTnLst>
+                          </p:cTn>
+                        </p:par>
+                      </p:childTnLst>
+                    </p:cTn>
+                  </p:par>
+                </p:childTnLst>
+              </p:cTn>
+              <p:prevCondLst>
+                <p:cond evt="onPrev" delay="0">
+                  <p:tgtEl>
+                    <p:sldTgt/>
+                  </p:tgtEl>
+                </p:cond>
+              </p:prevCondLst>
+              <p:nextCondLst>
+                <p:cond evt="onNext" delay="0">
+                  <p:tgtEl>
+                    <p:sldTgt/>
+                  </p:tgtEl>
+                </p:cond>
+              </p:nextCondLst>
+            </p:seq>
+          </p:childTnLst>
+        </p:cTn>
+      </p:par>
+    </p:tnLst>
+    <p:bldLst>
+      <p:bldP spid="14" grpId="0" animBg="1"/>
+      <p:bldP spid="3" grpId="0"/>
+      <p:bldP spid="4" grpId="0"/>
+      <p:bldP spid="5" grpId="0"/>
+      <p:bldP spid="15" grpId="0"/>
+      <p:bldP spid="32" grpId="0"/>
+      <p:bldP spid="33" grpId="0"/>
+      <p:bldP spid="34" grpId="0"/>
+      <p:bldP spid="35" grpId="0"/>
+      <p:bldP spid="36" grpId="0"/>
+      <p:bldP spid="37" grpId="0"/>
+      <p:bldP spid="39" grpId="0"/>
+    </p:bldLst>
+  </p:timing>
+</p:sld>
+</file>
+
+<file path=ppt/slides/slide8.xml><?xml version="1.0" encoding="utf-8"?>
+<p:sld xmlns:a="http://schemas.openxmlformats.org/drawingml/2006/main" xmlns:r="http://schemas.openxmlformats.org/officeDocument/2006/relationships" xmlns:p="http://schemas.openxmlformats.org/presentationml/2006/main">
+  <p:cSld>
+    <p:spTree>
+      <p:nvGrpSpPr>
+        <p:cNvPr id="1" name=""/>
+        <p:cNvGrpSpPr/>
+        <p:nvPr/>
+      </p:nvGrpSpPr>
+      <p:grpSpPr>
+        <a:xfrm>
+          <a:off x="0" y="0"/>
+          <a:ext cx="0" cy="0"/>
+          <a:chOff x="0" y="0"/>
+          <a:chExt cx="0" cy="0"/>
+        </a:xfrm>
+      </p:grpSpPr>
       <p:sp>
         <p:nvSpPr>
           <p:cNvPr id="3" name="Title 2"/>
@@ -4811,7 +8496,7 @@
           <a:p>
             <a:fld id="{14CB1CAA-32CD-4B55-B92A-B8F0843CACF4}" type="datetime2">
               <a:rPr lang="en-US" smtClean="0"/>
-              <a:t>Friday, May 5, 2017</a:t>
+              <a:t>Wednesday, June 7, 2017</a:t>
             </a:fld>
             <a:endParaRPr lang="en-US" dirty="0"/>
           </a:p>
@@ -4835,7 +8520,7 @@
             <a:fld id="{1789C0F2-17E0-497A-9BBE-0C73201AAFE3}" type="slidenum">
               <a:rPr lang="en-US" smtClean="0"/>
               <a:pPr/>
-              <a:t>7</a:t>
+              <a:t>8</a:t>
             </a:fld>
             <a:endParaRPr lang="en-US" dirty="0"/>
           </a:p>
@@ -4911,6 +8596,162 @@
   <p:clrMapOvr>
     <a:masterClrMapping/>
   </p:clrMapOvr>
+  <p:timing>
+    <p:tnLst>
+      <p:par>
+        <p:cTn id="1" dur="indefinite" restart="never" nodeType="tmRoot"/>
+      </p:par>
+    </p:tnLst>
+  </p:timing>
+</p:sld>
+</file>
+
+<file path=ppt/slides/slide9.xml><?xml version="1.0" encoding="utf-8"?>
+<p:sld xmlns:a="http://schemas.openxmlformats.org/drawingml/2006/main" xmlns:r="http://schemas.openxmlformats.org/officeDocument/2006/relationships" xmlns:p="http://schemas.openxmlformats.org/presentationml/2006/main">
+  <p:cSld>
+    <p:spTree>
+      <p:nvGrpSpPr>
+        <p:cNvPr id="1" name=""/>
+        <p:cNvGrpSpPr/>
+        <p:nvPr/>
+      </p:nvGrpSpPr>
+      <p:grpSpPr>
+        <a:xfrm>
+          <a:off x="0" y="0"/>
+          <a:ext cx="0" cy="0"/>
+          <a:chOff x="0" y="0"/>
+          <a:chExt cx="0" cy="0"/>
+        </a:xfrm>
+      </p:grpSpPr>
+      <p:sp>
+        <p:nvSpPr>
+          <p:cNvPr id="2" name="Text Placeholder 1"/>
+          <p:cNvSpPr>
+            <a:spLocks noGrp="1"/>
+          </p:cNvSpPr>
+          <p:nvPr>
+            <p:ph type="body" idx="1"/>
+          </p:nvPr>
+        </p:nvSpPr>
+        <p:spPr/>
+        <p:txBody>
+          <a:bodyPr/>
+          <a:lstStyle/>
+          <a:p>
+            <a:r>
+              <a:rPr lang="id-ID" dirty="0" smtClean="0"/>
+              <a:t>Thank You</a:t>
+            </a:r>
+            <a:endParaRPr lang="en-US" dirty="0"/>
+          </a:p>
+        </p:txBody>
+      </p:sp>
+      <p:sp>
+        <p:nvSpPr>
+          <p:cNvPr id="3" name="Date Placeholder 2"/>
+          <p:cNvSpPr>
+            <a:spLocks noGrp="1"/>
+          </p:cNvSpPr>
+          <p:nvPr>
+            <p:ph type="dt" sz="half" idx="10"/>
+          </p:nvPr>
+        </p:nvSpPr>
+        <p:spPr/>
+        <p:txBody>
+          <a:bodyPr/>
+          <a:lstStyle/>
+          <a:p>
+            <a:fld id="{3AD8CDC4-3D19-4983-B478-82F6B8E5AB66}" type="datetime2">
+              <a:rPr lang="en-US" smtClean="0"/>
+              <a:t>Wednesday, June 7, 2017</a:t>
+            </a:fld>
+            <a:endParaRPr lang="en-US" dirty="0"/>
+          </a:p>
+        </p:txBody>
+      </p:sp>
+      <p:sp>
+        <p:nvSpPr>
+          <p:cNvPr id="4" name="Slide Number Placeholder 3"/>
+          <p:cNvSpPr>
+            <a:spLocks noGrp="1"/>
+          </p:cNvSpPr>
+          <p:nvPr>
+            <p:ph type="sldNum" sz="quarter" idx="11"/>
+          </p:nvPr>
+        </p:nvSpPr>
+        <p:spPr/>
+        <p:txBody>
+          <a:bodyPr/>
+          <a:lstStyle/>
+          <a:p>
+            <a:fld id="{1789C0F2-17E0-497A-9BBE-0C73201AAFE3}" type="slidenum">
+              <a:rPr lang="en-US" smtClean="0"/>
+              <a:pPr/>
+              <a:t>9</a:t>
+            </a:fld>
+            <a:endParaRPr lang="en-US" dirty="0"/>
+          </a:p>
+        </p:txBody>
+      </p:sp>
+      <p:sp>
+        <p:nvSpPr>
+          <p:cNvPr id="5" name="Footer Placeholder 4"/>
+          <p:cNvSpPr>
+            <a:spLocks noGrp="1"/>
+          </p:cNvSpPr>
+          <p:nvPr>
+            <p:ph type="ftr" sz="quarter" idx="12"/>
+          </p:nvPr>
+        </p:nvSpPr>
+        <p:spPr/>
+        <p:txBody>
+          <a:bodyPr/>
+          <a:lstStyle/>
+          <a:p>
+            <a:endParaRPr lang="en-US" dirty="0"/>
+          </a:p>
+        </p:txBody>
+      </p:sp>
+      <p:sp>
+        <p:nvSpPr>
+          <p:cNvPr id="6" name="Title 5"/>
+          <p:cNvSpPr>
+            <a:spLocks noGrp="1"/>
+          </p:cNvSpPr>
+          <p:nvPr>
+            <p:ph type="title"/>
+          </p:nvPr>
+        </p:nvSpPr>
+        <p:spPr/>
+        <p:txBody>
+          <a:bodyPr/>
+          <a:lstStyle/>
+          <a:p>
+            <a:r>
+              <a:rPr lang="id-ID" dirty="0" smtClean="0"/>
+              <a:t>That’s all</a:t>
+            </a:r>
+            <a:endParaRPr lang="en-US" dirty="0"/>
+          </a:p>
+        </p:txBody>
+      </p:sp>
+    </p:spTree>
+    <p:extLst>
+      <p:ext uri="{BB962C8B-B14F-4D97-AF65-F5344CB8AC3E}">
+        <p14:creationId xmlns:p14="http://schemas.microsoft.com/office/powerpoint/2010/main" val="398080087"/>
+      </p:ext>
+    </p:extLst>
+  </p:cSld>
+  <p:clrMapOvr>
+    <a:masterClrMapping/>
+  </p:clrMapOvr>
+  <p:timing>
+    <p:tnLst>
+      <p:par>
+        <p:cTn id="1" dur="indefinite" restart="never" nodeType="tmRoot"/>
+      </p:par>
+    </p:tnLst>
+  </p:timing>
 </p:sld>
 </file>
 

</xml_diff>